<commit_message>
Update 0515 project06 - 파워포인트 - 민기.pptx
</commit_message>
<xml_diff>
--- a/0 발표용 파워포인트/0515 2차발표/0515 project06 - 파워포인트 - 민기.pptx
+++ b/0 발표용 파워포인트/0515 2차발표/0515 project06 - 파워포인트 - 민기.pptx
@@ -6,7 +6,7 @@
     <p:sldMasterId id="2147483660" r:id="rId2"/>
   </p:sldMasterIdLst>
   <p:notesMasterIdLst>
-    <p:notesMasterId r:id="rId9"/>
+    <p:notesMasterId r:id="rId12"/>
   </p:notesMasterIdLst>
   <p:sldIdLst>
     <p:sldId id="256" r:id="rId3"/>
@@ -15,6 +15,9 @@
     <p:sldId id="258" r:id="rId6"/>
     <p:sldId id="259" r:id="rId7"/>
     <p:sldId id="260" r:id="rId8"/>
+    <p:sldId id="264" r:id="rId9"/>
+    <p:sldId id="262" r:id="rId10"/>
+    <p:sldId id="263" r:id="rId11"/>
   </p:sldIdLst>
   <p:sldSz cx="12192000" cy="6858000"/>
   <p:notesSz cx="6858000" cy="9144000"/>
@@ -11814,6 +11817,4247 @@
     <p:extLst>
       <p:ext uri="{BB962C8B-B14F-4D97-AF65-F5344CB8AC3E}">
         <p14:creationId xmlns:p14="http://schemas.microsoft.com/office/powerpoint/2010/main" val="3635679624"/>
+      </p:ext>
+    </p:extLst>
+  </p:cSld>
+  <p:clrMapOvr>
+    <a:masterClrMapping/>
+  </p:clrMapOvr>
+  <p:timing>
+    <p:tnLst>
+      <p:par>
+        <p:cTn id="1" dur="indefinite" restart="never" nodeType="tmRoot"/>
+      </p:par>
+    </p:tnLst>
+  </p:timing>
+</p:sld>
+</file>
+
+<file path=ppt/slides/slide7.xml><?xml version="1.0" encoding="utf-8"?>
+<p:sld xmlns:a="http://schemas.openxmlformats.org/drawingml/2006/main" xmlns:r="http://schemas.openxmlformats.org/officeDocument/2006/relationships" xmlns:p="http://schemas.openxmlformats.org/presentationml/2006/main">
+  <p:cSld>
+    <p:spTree>
+      <p:nvGrpSpPr>
+        <p:cNvPr id="1" name=""/>
+        <p:cNvGrpSpPr/>
+        <p:nvPr/>
+      </p:nvGrpSpPr>
+      <p:grpSpPr>
+        <a:xfrm>
+          <a:off x="0" y="0"/>
+          <a:ext cx="0" cy="0"/>
+          <a:chOff x="0" y="0"/>
+          <a:chExt cx="0" cy="0"/>
+        </a:xfrm>
+      </p:grpSpPr>
+      <p:sp>
+        <p:nvSpPr>
+          <p:cNvPr id="18" name="직사각형 17"/>
+          <p:cNvSpPr/>
+          <p:nvPr/>
+        </p:nvSpPr>
+        <p:spPr>
+          <a:xfrm rot="21409477">
+            <a:off x="832975" y="128932"/>
+            <a:ext cx="9282799" cy="6218171"/>
+          </a:xfrm>
+          <a:prstGeom prst="rect">
+            <a:avLst/>
+          </a:prstGeom>
+          <a:solidFill>
+            <a:schemeClr val="bg1">
+              <a:lumMod val="95000"/>
+            </a:schemeClr>
+          </a:solidFill>
+          <a:ln>
+            <a:noFill/>
+          </a:ln>
+        </p:spPr>
+        <p:style>
+          <a:lnRef idx="2">
+            <a:schemeClr val="accent1">
+              <a:shade val="50000"/>
+            </a:schemeClr>
+          </a:lnRef>
+          <a:fillRef idx="1">
+            <a:schemeClr val="accent1"/>
+          </a:fillRef>
+          <a:effectRef idx="0">
+            <a:schemeClr val="accent1"/>
+          </a:effectRef>
+          <a:fontRef idx="minor">
+            <a:schemeClr val="lt1"/>
+          </a:fontRef>
+        </p:style>
+        <p:txBody>
+          <a:bodyPr lIns="91440" tIns="45720" rIns="91440" bIns="45720" rtlCol="0" anchor="ctr"/>
+          <a:lstStyle/>
+          <a:p>
+            <a:pPr algn="ctr" latinLnBrk="0">
+              <a:buClr>
+                <a:srgbClr val="000000"/>
+              </a:buClr>
+              <a:buFont typeface="Arial"/>
+              <a:buNone/>
+            </a:pPr>
+            <a:endParaRPr lang="ko-KR" altLang="en-US" sz="2400" kern="0">
+              <a:solidFill>
+                <a:srgbClr val="FFFFFF"/>
+              </a:solidFill>
+              <a:sym typeface="Arial"/>
+            </a:endParaRPr>
+          </a:p>
+        </p:txBody>
+      </p:sp>
+      <p:sp>
+        <p:nvSpPr>
+          <p:cNvPr id="5" name="직사각형 4"/>
+          <p:cNvSpPr/>
+          <p:nvPr/>
+        </p:nvSpPr>
+        <p:spPr>
+          <a:xfrm>
+            <a:off x="667880" y="331857"/>
+            <a:ext cx="11425909" cy="6392929"/>
+          </a:xfrm>
+          <a:prstGeom prst="rect">
+            <a:avLst/>
+          </a:prstGeom>
+          <a:gradFill flip="none" rotWithShape="1">
+            <a:gsLst>
+              <a:gs pos="100000">
+                <a:schemeClr val="bg1">
+                  <a:shade val="67500"/>
+                  <a:satMod val="115000"/>
+                </a:schemeClr>
+              </a:gs>
+              <a:gs pos="64000">
+                <a:schemeClr val="bg1">
+                  <a:shade val="100000"/>
+                  <a:satMod val="115000"/>
+                </a:schemeClr>
+              </a:gs>
+            </a:gsLst>
+            <a:lin ang="10800000" scaled="1"/>
+            <a:tileRect/>
+          </a:gradFill>
+          <a:ln>
+            <a:noFill/>
+          </a:ln>
+          <a:effectLst>
+            <a:outerShdw blurRad="228600" dist="76200" dir="16200000" rotWithShape="0">
+              <a:prstClr val="black">
+                <a:alpha val="40000"/>
+              </a:prstClr>
+            </a:outerShdw>
+          </a:effectLst>
+        </p:spPr>
+        <p:style>
+          <a:lnRef idx="2">
+            <a:schemeClr val="accent1">
+              <a:shade val="50000"/>
+            </a:schemeClr>
+          </a:lnRef>
+          <a:fillRef idx="1">
+            <a:schemeClr val="accent1"/>
+          </a:fillRef>
+          <a:effectRef idx="0">
+            <a:schemeClr val="accent1"/>
+          </a:effectRef>
+          <a:fontRef idx="minor">
+            <a:schemeClr val="lt1"/>
+          </a:fontRef>
+        </p:style>
+        <p:txBody>
+          <a:bodyPr lIns="91440" tIns="45720" rIns="91440" bIns="45720" rtlCol="0" anchor="ctr"/>
+          <a:lstStyle/>
+          <a:p>
+            <a:pPr algn="ctr" latinLnBrk="0">
+              <a:buClr>
+                <a:srgbClr val="000000"/>
+              </a:buClr>
+              <a:buFont typeface="Arial"/>
+              <a:buNone/>
+            </a:pPr>
+            <a:endParaRPr lang="ko-KR" altLang="en-US" sz="2400" kern="0">
+              <a:solidFill>
+                <a:srgbClr val="FFFFFF"/>
+              </a:solidFill>
+              <a:sym typeface="Arial"/>
+            </a:endParaRPr>
+          </a:p>
+        </p:txBody>
+      </p:sp>
+      <p:grpSp>
+        <p:nvGrpSpPr>
+          <p:cNvPr id="2" name="그룹 1"/>
+          <p:cNvGrpSpPr/>
+          <p:nvPr/>
+        </p:nvGrpSpPr>
+        <p:grpSpPr>
+          <a:xfrm>
+            <a:off x="143105" y="68627"/>
+            <a:ext cx="768321" cy="6704028"/>
+            <a:chOff x="586490" y="739768"/>
+            <a:chExt cx="1017302" cy="5420168"/>
+          </a:xfrm>
+        </p:grpSpPr>
+        <p:sp>
+          <p:nvSpPr>
+            <p:cNvPr id="39" name="자유형 38"/>
+            <p:cNvSpPr/>
+            <p:nvPr/>
+          </p:nvSpPr>
+          <p:spPr>
+            <a:xfrm rot="10800000">
+              <a:off x="586490" y="1041378"/>
+              <a:ext cx="1017302" cy="4991063"/>
+            </a:xfrm>
+            <a:custGeom>
+              <a:avLst/>
+              <a:gdLst>
+                <a:gd name="connsiteX0" fmla="*/ 194310 w 388620"/>
+                <a:gd name="connsiteY0" fmla="*/ 0 h 2927235"/>
+                <a:gd name="connsiteX1" fmla="*/ 388620 w 388620"/>
+                <a:gd name="connsiteY1" fmla="*/ 194310 h 2927235"/>
+                <a:gd name="connsiteX2" fmla="*/ 388620 w 388620"/>
+                <a:gd name="connsiteY2" fmla="*/ 2927235 h 2927235"/>
+                <a:gd name="connsiteX3" fmla="*/ 379599 w 388620"/>
+                <a:gd name="connsiteY3" fmla="*/ 2898175 h 2927235"/>
+                <a:gd name="connsiteX4" fmla="*/ 194310 w 388620"/>
+                <a:gd name="connsiteY4" fmla="*/ 2775357 h 2927235"/>
+                <a:gd name="connsiteX5" fmla="*/ 9021 w 388620"/>
+                <a:gd name="connsiteY5" fmla="*/ 2898175 h 2927235"/>
+                <a:gd name="connsiteX6" fmla="*/ 0 w 388620"/>
+                <a:gd name="connsiteY6" fmla="*/ 2927235 h 2927235"/>
+                <a:gd name="connsiteX7" fmla="*/ 0 w 388620"/>
+                <a:gd name="connsiteY7" fmla="*/ 194310 h 2927235"/>
+                <a:gd name="connsiteX8" fmla="*/ 194310 w 388620"/>
+                <a:gd name="connsiteY8" fmla="*/ 0 h 2927235"/>
+              </a:gdLst>
+              <a:ahLst/>
+              <a:cxnLst>
+                <a:cxn ang="0">
+                  <a:pos x="connsiteX0" y="connsiteY0"/>
+                </a:cxn>
+                <a:cxn ang="0">
+                  <a:pos x="connsiteX1" y="connsiteY1"/>
+                </a:cxn>
+                <a:cxn ang="0">
+                  <a:pos x="connsiteX2" y="connsiteY2"/>
+                </a:cxn>
+                <a:cxn ang="0">
+                  <a:pos x="connsiteX3" y="connsiteY3"/>
+                </a:cxn>
+                <a:cxn ang="0">
+                  <a:pos x="connsiteX4" y="connsiteY4"/>
+                </a:cxn>
+                <a:cxn ang="0">
+                  <a:pos x="connsiteX5" y="connsiteY5"/>
+                </a:cxn>
+                <a:cxn ang="0">
+                  <a:pos x="connsiteX6" y="connsiteY6"/>
+                </a:cxn>
+                <a:cxn ang="0">
+                  <a:pos x="connsiteX7" y="connsiteY7"/>
+                </a:cxn>
+                <a:cxn ang="0">
+                  <a:pos x="connsiteX8" y="connsiteY8"/>
+                </a:cxn>
+              </a:cxnLst>
+              <a:rect l="l" t="t" r="r" b="b"/>
+              <a:pathLst>
+                <a:path w="388620" h="2927235">
+                  <a:moveTo>
+                    <a:pt x="194310" y="0"/>
+                  </a:moveTo>
+                  <a:cubicBezTo>
+                    <a:pt x="301624" y="0"/>
+                    <a:pt x="388620" y="86996"/>
+                    <a:pt x="388620" y="194310"/>
+                  </a:cubicBezTo>
+                  <a:lnTo>
+                    <a:pt x="388620" y="2927235"/>
+                  </a:lnTo>
+                  <a:lnTo>
+                    <a:pt x="379599" y="2898175"/>
+                  </a:lnTo>
+                  <a:cubicBezTo>
+                    <a:pt x="349072" y="2826000"/>
+                    <a:pt x="277605" y="2775357"/>
+                    <a:pt x="194310" y="2775357"/>
+                  </a:cubicBezTo>
+                  <a:cubicBezTo>
+                    <a:pt x="111015" y="2775357"/>
+                    <a:pt x="39548" y="2826000"/>
+                    <a:pt x="9021" y="2898175"/>
+                  </a:cubicBezTo>
+                  <a:lnTo>
+                    <a:pt x="0" y="2927235"/>
+                  </a:lnTo>
+                  <a:lnTo>
+                    <a:pt x="0" y="194310"/>
+                  </a:lnTo>
+                  <a:cubicBezTo>
+                    <a:pt x="0" y="86996"/>
+                    <a:pt x="86996" y="0"/>
+                    <a:pt x="194310" y="0"/>
+                  </a:cubicBezTo>
+                  <a:close/>
+                </a:path>
+              </a:pathLst>
+            </a:custGeom>
+            <a:gradFill flip="none" rotWithShape="1">
+              <a:gsLst>
+                <a:gs pos="0">
+                  <a:schemeClr val="bg1">
+                    <a:shade val="67500"/>
+                    <a:satMod val="115000"/>
+                  </a:schemeClr>
+                </a:gs>
+                <a:gs pos="100000">
+                  <a:schemeClr val="bg1">
+                    <a:shade val="100000"/>
+                    <a:satMod val="115000"/>
+                  </a:schemeClr>
+                </a:gs>
+              </a:gsLst>
+              <a:lin ang="10800000" scaled="1"/>
+              <a:tileRect/>
+            </a:gradFill>
+            <a:ln>
+              <a:noFill/>
+            </a:ln>
+            <a:effectLst>
+              <a:outerShdw blurRad="88900" dist="139700" dir="5400000" sx="98000" sy="98000" algn="t" rotWithShape="0">
+                <a:prstClr val="black">
+                  <a:alpha val="40000"/>
+                </a:prstClr>
+              </a:outerShdw>
+            </a:effectLst>
+          </p:spPr>
+          <p:style>
+            <a:lnRef idx="2">
+              <a:schemeClr val="accent1">
+                <a:shade val="50000"/>
+              </a:schemeClr>
+            </a:lnRef>
+            <a:fillRef idx="1">
+              <a:schemeClr val="accent1"/>
+            </a:fillRef>
+            <a:effectRef idx="0">
+              <a:schemeClr val="accent1"/>
+            </a:effectRef>
+            <a:fontRef idx="minor">
+              <a:schemeClr val="lt1"/>
+            </a:fontRef>
+          </p:style>
+          <p:txBody>
+            <a:bodyPr rtlCol="0" anchor="ctr"/>
+            <a:lstStyle/>
+            <a:p>
+              <a:pPr algn="ctr" latinLnBrk="0">
+                <a:buClr>
+                  <a:srgbClr val="000000"/>
+                </a:buClr>
+                <a:buFont typeface="Arial"/>
+                <a:buNone/>
+              </a:pPr>
+              <a:endParaRPr lang="ko-KR" altLang="en-US" sz="2400" kern="0">
+                <a:solidFill>
+                  <a:srgbClr val="FFFFFF"/>
+                </a:solidFill>
+                <a:sym typeface="Arial"/>
+              </a:endParaRPr>
+            </a:p>
+          </p:txBody>
+        </p:sp>
+        <p:sp>
+          <p:nvSpPr>
+            <p:cNvPr id="40" name="자유형 39"/>
+            <p:cNvSpPr/>
+            <p:nvPr/>
+          </p:nvSpPr>
+          <p:spPr>
+            <a:xfrm rot="10800000">
+              <a:off x="754421" y="2816677"/>
+              <a:ext cx="681439" cy="3343259"/>
+            </a:xfrm>
+            <a:custGeom>
+              <a:avLst/>
+              <a:gdLst>
+                <a:gd name="connsiteX0" fmla="*/ 194310 w 388620"/>
+                <a:gd name="connsiteY0" fmla="*/ 0 h 2927235"/>
+                <a:gd name="connsiteX1" fmla="*/ 388620 w 388620"/>
+                <a:gd name="connsiteY1" fmla="*/ 194310 h 2927235"/>
+                <a:gd name="connsiteX2" fmla="*/ 388620 w 388620"/>
+                <a:gd name="connsiteY2" fmla="*/ 2927235 h 2927235"/>
+                <a:gd name="connsiteX3" fmla="*/ 379599 w 388620"/>
+                <a:gd name="connsiteY3" fmla="*/ 2898175 h 2927235"/>
+                <a:gd name="connsiteX4" fmla="*/ 194310 w 388620"/>
+                <a:gd name="connsiteY4" fmla="*/ 2775357 h 2927235"/>
+                <a:gd name="connsiteX5" fmla="*/ 9021 w 388620"/>
+                <a:gd name="connsiteY5" fmla="*/ 2898175 h 2927235"/>
+                <a:gd name="connsiteX6" fmla="*/ 0 w 388620"/>
+                <a:gd name="connsiteY6" fmla="*/ 2927235 h 2927235"/>
+                <a:gd name="connsiteX7" fmla="*/ 0 w 388620"/>
+                <a:gd name="connsiteY7" fmla="*/ 194310 h 2927235"/>
+                <a:gd name="connsiteX8" fmla="*/ 194310 w 388620"/>
+                <a:gd name="connsiteY8" fmla="*/ 0 h 2927235"/>
+              </a:gdLst>
+              <a:ahLst/>
+              <a:cxnLst>
+                <a:cxn ang="0">
+                  <a:pos x="connsiteX0" y="connsiteY0"/>
+                </a:cxn>
+                <a:cxn ang="0">
+                  <a:pos x="connsiteX1" y="connsiteY1"/>
+                </a:cxn>
+                <a:cxn ang="0">
+                  <a:pos x="connsiteX2" y="connsiteY2"/>
+                </a:cxn>
+                <a:cxn ang="0">
+                  <a:pos x="connsiteX3" y="connsiteY3"/>
+                </a:cxn>
+                <a:cxn ang="0">
+                  <a:pos x="connsiteX4" y="connsiteY4"/>
+                </a:cxn>
+                <a:cxn ang="0">
+                  <a:pos x="connsiteX5" y="connsiteY5"/>
+                </a:cxn>
+                <a:cxn ang="0">
+                  <a:pos x="connsiteX6" y="connsiteY6"/>
+                </a:cxn>
+                <a:cxn ang="0">
+                  <a:pos x="connsiteX7" y="connsiteY7"/>
+                </a:cxn>
+                <a:cxn ang="0">
+                  <a:pos x="connsiteX8" y="connsiteY8"/>
+                </a:cxn>
+              </a:cxnLst>
+              <a:rect l="l" t="t" r="r" b="b"/>
+              <a:pathLst>
+                <a:path w="388620" h="2927235">
+                  <a:moveTo>
+                    <a:pt x="194310" y="0"/>
+                  </a:moveTo>
+                  <a:cubicBezTo>
+                    <a:pt x="301624" y="0"/>
+                    <a:pt x="388620" y="86996"/>
+                    <a:pt x="388620" y="194310"/>
+                  </a:cubicBezTo>
+                  <a:lnTo>
+                    <a:pt x="388620" y="2927235"/>
+                  </a:lnTo>
+                  <a:lnTo>
+                    <a:pt x="379599" y="2898175"/>
+                  </a:lnTo>
+                  <a:cubicBezTo>
+                    <a:pt x="349072" y="2826000"/>
+                    <a:pt x="277605" y="2775357"/>
+                    <a:pt x="194310" y="2775357"/>
+                  </a:cubicBezTo>
+                  <a:cubicBezTo>
+                    <a:pt x="111015" y="2775357"/>
+                    <a:pt x="39548" y="2826000"/>
+                    <a:pt x="9021" y="2898175"/>
+                  </a:cubicBezTo>
+                  <a:lnTo>
+                    <a:pt x="0" y="2927235"/>
+                  </a:lnTo>
+                  <a:lnTo>
+                    <a:pt x="0" y="194310"/>
+                  </a:lnTo>
+                  <a:cubicBezTo>
+                    <a:pt x="0" y="86996"/>
+                    <a:pt x="86996" y="0"/>
+                    <a:pt x="194310" y="0"/>
+                  </a:cubicBezTo>
+                  <a:close/>
+                </a:path>
+              </a:pathLst>
+            </a:custGeom>
+            <a:gradFill flip="none" rotWithShape="1">
+              <a:gsLst>
+                <a:gs pos="0">
+                  <a:schemeClr val="bg1">
+                    <a:shade val="67500"/>
+                    <a:satMod val="115000"/>
+                  </a:schemeClr>
+                </a:gs>
+                <a:gs pos="100000">
+                  <a:schemeClr val="bg1">
+                    <a:shade val="100000"/>
+                    <a:satMod val="115000"/>
+                  </a:schemeClr>
+                </a:gs>
+              </a:gsLst>
+              <a:lin ang="10800000" scaled="1"/>
+              <a:tileRect/>
+            </a:gradFill>
+            <a:ln>
+              <a:noFill/>
+            </a:ln>
+            <a:effectLst>
+              <a:outerShdw blurRad="88900" dist="139700" dir="5400000" sx="98000" sy="98000" algn="t" rotWithShape="0">
+                <a:prstClr val="black">
+                  <a:alpha val="40000"/>
+                </a:prstClr>
+              </a:outerShdw>
+            </a:effectLst>
+          </p:spPr>
+          <p:style>
+            <a:lnRef idx="2">
+              <a:schemeClr val="accent1">
+                <a:shade val="50000"/>
+              </a:schemeClr>
+            </a:lnRef>
+            <a:fillRef idx="1">
+              <a:schemeClr val="accent1"/>
+            </a:fillRef>
+            <a:effectRef idx="0">
+              <a:schemeClr val="accent1"/>
+            </a:effectRef>
+            <a:fontRef idx="minor">
+              <a:schemeClr val="lt1"/>
+            </a:fontRef>
+          </p:style>
+          <p:txBody>
+            <a:bodyPr rtlCol="0" anchor="ctr"/>
+            <a:lstStyle/>
+            <a:p>
+              <a:pPr algn="ctr" latinLnBrk="0">
+                <a:buClr>
+                  <a:srgbClr val="000000"/>
+                </a:buClr>
+                <a:buFont typeface="Arial"/>
+                <a:buNone/>
+              </a:pPr>
+              <a:endParaRPr lang="ko-KR" altLang="en-US" sz="2400" kern="0">
+                <a:solidFill>
+                  <a:srgbClr val="FFFFFF"/>
+                </a:solidFill>
+                <a:sym typeface="Arial"/>
+              </a:endParaRPr>
+            </a:p>
+          </p:txBody>
+        </p:sp>
+        <p:sp>
+          <p:nvSpPr>
+            <p:cNvPr id="41" name="자유형 40"/>
+            <p:cNvSpPr/>
+            <p:nvPr/>
+          </p:nvSpPr>
+          <p:spPr>
+            <a:xfrm>
+              <a:off x="754421" y="2614644"/>
+              <a:ext cx="681439" cy="3343259"/>
+            </a:xfrm>
+            <a:custGeom>
+              <a:avLst/>
+              <a:gdLst>
+                <a:gd name="connsiteX0" fmla="*/ 194310 w 388620"/>
+                <a:gd name="connsiteY0" fmla="*/ 0 h 2927235"/>
+                <a:gd name="connsiteX1" fmla="*/ 388620 w 388620"/>
+                <a:gd name="connsiteY1" fmla="*/ 194310 h 2927235"/>
+                <a:gd name="connsiteX2" fmla="*/ 388620 w 388620"/>
+                <a:gd name="connsiteY2" fmla="*/ 2927235 h 2927235"/>
+                <a:gd name="connsiteX3" fmla="*/ 379599 w 388620"/>
+                <a:gd name="connsiteY3" fmla="*/ 2898175 h 2927235"/>
+                <a:gd name="connsiteX4" fmla="*/ 194310 w 388620"/>
+                <a:gd name="connsiteY4" fmla="*/ 2775357 h 2927235"/>
+                <a:gd name="connsiteX5" fmla="*/ 9021 w 388620"/>
+                <a:gd name="connsiteY5" fmla="*/ 2898175 h 2927235"/>
+                <a:gd name="connsiteX6" fmla="*/ 0 w 388620"/>
+                <a:gd name="connsiteY6" fmla="*/ 2927235 h 2927235"/>
+                <a:gd name="connsiteX7" fmla="*/ 0 w 388620"/>
+                <a:gd name="connsiteY7" fmla="*/ 194310 h 2927235"/>
+                <a:gd name="connsiteX8" fmla="*/ 194310 w 388620"/>
+                <a:gd name="connsiteY8" fmla="*/ 0 h 2927235"/>
+              </a:gdLst>
+              <a:ahLst/>
+              <a:cxnLst>
+                <a:cxn ang="0">
+                  <a:pos x="connsiteX0" y="connsiteY0"/>
+                </a:cxn>
+                <a:cxn ang="0">
+                  <a:pos x="connsiteX1" y="connsiteY1"/>
+                </a:cxn>
+                <a:cxn ang="0">
+                  <a:pos x="connsiteX2" y="connsiteY2"/>
+                </a:cxn>
+                <a:cxn ang="0">
+                  <a:pos x="connsiteX3" y="connsiteY3"/>
+                </a:cxn>
+                <a:cxn ang="0">
+                  <a:pos x="connsiteX4" y="connsiteY4"/>
+                </a:cxn>
+                <a:cxn ang="0">
+                  <a:pos x="connsiteX5" y="connsiteY5"/>
+                </a:cxn>
+                <a:cxn ang="0">
+                  <a:pos x="connsiteX6" y="connsiteY6"/>
+                </a:cxn>
+                <a:cxn ang="0">
+                  <a:pos x="connsiteX7" y="connsiteY7"/>
+                </a:cxn>
+                <a:cxn ang="0">
+                  <a:pos x="connsiteX8" y="connsiteY8"/>
+                </a:cxn>
+              </a:cxnLst>
+              <a:rect l="l" t="t" r="r" b="b"/>
+              <a:pathLst>
+                <a:path w="388620" h="2927235">
+                  <a:moveTo>
+                    <a:pt x="194310" y="0"/>
+                  </a:moveTo>
+                  <a:cubicBezTo>
+                    <a:pt x="301624" y="0"/>
+                    <a:pt x="388620" y="86996"/>
+                    <a:pt x="388620" y="194310"/>
+                  </a:cubicBezTo>
+                  <a:lnTo>
+                    <a:pt x="388620" y="2927235"/>
+                  </a:lnTo>
+                  <a:lnTo>
+                    <a:pt x="379599" y="2898175"/>
+                  </a:lnTo>
+                  <a:cubicBezTo>
+                    <a:pt x="349072" y="2826000"/>
+                    <a:pt x="277605" y="2775357"/>
+                    <a:pt x="194310" y="2775357"/>
+                  </a:cubicBezTo>
+                  <a:cubicBezTo>
+                    <a:pt x="111015" y="2775357"/>
+                    <a:pt x="39548" y="2826000"/>
+                    <a:pt x="9021" y="2898175"/>
+                  </a:cubicBezTo>
+                  <a:lnTo>
+                    <a:pt x="0" y="2927235"/>
+                  </a:lnTo>
+                  <a:lnTo>
+                    <a:pt x="0" y="194310"/>
+                  </a:lnTo>
+                  <a:cubicBezTo>
+                    <a:pt x="0" y="86996"/>
+                    <a:pt x="86996" y="0"/>
+                    <a:pt x="194310" y="0"/>
+                  </a:cubicBezTo>
+                  <a:close/>
+                </a:path>
+              </a:pathLst>
+            </a:custGeom>
+            <a:gradFill flip="none" rotWithShape="1">
+              <a:gsLst>
+                <a:gs pos="0">
+                  <a:schemeClr val="bg1">
+                    <a:shade val="67500"/>
+                    <a:satMod val="115000"/>
+                  </a:schemeClr>
+                </a:gs>
+                <a:gs pos="100000">
+                  <a:schemeClr val="bg1">
+                    <a:shade val="100000"/>
+                    <a:satMod val="115000"/>
+                  </a:schemeClr>
+                </a:gs>
+              </a:gsLst>
+              <a:lin ang="10800000" scaled="1"/>
+              <a:tileRect/>
+            </a:gradFill>
+            <a:ln>
+              <a:noFill/>
+            </a:ln>
+            <a:effectLst>
+              <a:outerShdw blurRad="88900" dist="139700" dir="5400000" sx="98000" sy="98000" algn="t" rotWithShape="0">
+                <a:prstClr val="black">
+                  <a:alpha val="40000"/>
+                </a:prstClr>
+              </a:outerShdw>
+            </a:effectLst>
+          </p:spPr>
+          <p:style>
+            <a:lnRef idx="2">
+              <a:schemeClr val="accent1">
+                <a:shade val="50000"/>
+              </a:schemeClr>
+            </a:lnRef>
+            <a:fillRef idx="1">
+              <a:schemeClr val="accent1"/>
+            </a:fillRef>
+            <a:effectRef idx="0">
+              <a:schemeClr val="accent1"/>
+            </a:effectRef>
+            <a:fontRef idx="minor">
+              <a:schemeClr val="lt1"/>
+            </a:fontRef>
+          </p:style>
+          <p:txBody>
+            <a:bodyPr rtlCol="0" anchor="ctr"/>
+            <a:lstStyle/>
+            <a:p>
+              <a:pPr algn="ctr" latinLnBrk="0">
+                <a:buClr>
+                  <a:srgbClr val="000000"/>
+                </a:buClr>
+                <a:buFont typeface="Arial"/>
+                <a:buNone/>
+              </a:pPr>
+              <a:endParaRPr lang="ko-KR" altLang="en-US" sz="2400" kern="0">
+                <a:solidFill>
+                  <a:srgbClr val="FFFFFF"/>
+                </a:solidFill>
+                <a:sym typeface="Arial"/>
+              </a:endParaRPr>
+            </a:p>
+          </p:txBody>
+        </p:sp>
+        <p:sp>
+          <p:nvSpPr>
+            <p:cNvPr id="42" name="자유형 41"/>
+            <p:cNvSpPr/>
+            <p:nvPr/>
+          </p:nvSpPr>
+          <p:spPr>
+            <a:xfrm>
+              <a:off x="586490" y="739768"/>
+              <a:ext cx="1017302" cy="4991063"/>
+            </a:xfrm>
+            <a:custGeom>
+              <a:avLst/>
+              <a:gdLst>
+                <a:gd name="connsiteX0" fmla="*/ 194310 w 388620"/>
+                <a:gd name="connsiteY0" fmla="*/ 0 h 2927235"/>
+                <a:gd name="connsiteX1" fmla="*/ 388620 w 388620"/>
+                <a:gd name="connsiteY1" fmla="*/ 194310 h 2927235"/>
+                <a:gd name="connsiteX2" fmla="*/ 388620 w 388620"/>
+                <a:gd name="connsiteY2" fmla="*/ 2927235 h 2927235"/>
+                <a:gd name="connsiteX3" fmla="*/ 379599 w 388620"/>
+                <a:gd name="connsiteY3" fmla="*/ 2898175 h 2927235"/>
+                <a:gd name="connsiteX4" fmla="*/ 194310 w 388620"/>
+                <a:gd name="connsiteY4" fmla="*/ 2775357 h 2927235"/>
+                <a:gd name="connsiteX5" fmla="*/ 9021 w 388620"/>
+                <a:gd name="connsiteY5" fmla="*/ 2898175 h 2927235"/>
+                <a:gd name="connsiteX6" fmla="*/ 0 w 388620"/>
+                <a:gd name="connsiteY6" fmla="*/ 2927235 h 2927235"/>
+                <a:gd name="connsiteX7" fmla="*/ 0 w 388620"/>
+                <a:gd name="connsiteY7" fmla="*/ 194310 h 2927235"/>
+                <a:gd name="connsiteX8" fmla="*/ 194310 w 388620"/>
+                <a:gd name="connsiteY8" fmla="*/ 0 h 2927235"/>
+              </a:gdLst>
+              <a:ahLst/>
+              <a:cxnLst>
+                <a:cxn ang="0">
+                  <a:pos x="connsiteX0" y="connsiteY0"/>
+                </a:cxn>
+                <a:cxn ang="0">
+                  <a:pos x="connsiteX1" y="connsiteY1"/>
+                </a:cxn>
+                <a:cxn ang="0">
+                  <a:pos x="connsiteX2" y="connsiteY2"/>
+                </a:cxn>
+                <a:cxn ang="0">
+                  <a:pos x="connsiteX3" y="connsiteY3"/>
+                </a:cxn>
+                <a:cxn ang="0">
+                  <a:pos x="connsiteX4" y="connsiteY4"/>
+                </a:cxn>
+                <a:cxn ang="0">
+                  <a:pos x="connsiteX5" y="connsiteY5"/>
+                </a:cxn>
+                <a:cxn ang="0">
+                  <a:pos x="connsiteX6" y="connsiteY6"/>
+                </a:cxn>
+                <a:cxn ang="0">
+                  <a:pos x="connsiteX7" y="connsiteY7"/>
+                </a:cxn>
+                <a:cxn ang="0">
+                  <a:pos x="connsiteX8" y="connsiteY8"/>
+                </a:cxn>
+              </a:cxnLst>
+              <a:rect l="l" t="t" r="r" b="b"/>
+              <a:pathLst>
+                <a:path w="388620" h="2927235">
+                  <a:moveTo>
+                    <a:pt x="194310" y="0"/>
+                  </a:moveTo>
+                  <a:cubicBezTo>
+                    <a:pt x="301624" y="0"/>
+                    <a:pt x="388620" y="86996"/>
+                    <a:pt x="388620" y="194310"/>
+                  </a:cubicBezTo>
+                  <a:lnTo>
+                    <a:pt x="388620" y="2927235"/>
+                  </a:lnTo>
+                  <a:lnTo>
+                    <a:pt x="379599" y="2898175"/>
+                  </a:lnTo>
+                  <a:cubicBezTo>
+                    <a:pt x="349072" y="2826000"/>
+                    <a:pt x="277605" y="2775357"/>
+                    <a:pt x="194310" y="2775357"/>
+                  </a:cubicBezTo>
+                  <a:cubicBezTo>
+                    <a:pt x="111015" y="2775357"/>
+                    <a:pt x="39548" y="2826000"/>
+                    <a:pt x="9021" y="2898175"/>
+                  </a:cubicBezTo>
+                  <a:lnTo>
+                    <a:pt x="0" y="2927235"/>
+                  </a:lnTo>
+                  <a:lnTo>
+                    <a:pt x="0" y="194310"/>
+                  </a:lnTo>
+                  <a:cubicBezTo>
+                    <a:pt x="0" y="86996"/>
+                    <a:pt x="86996" y="0"/>
+                    <a:pt x="194310" y="0"/>
+                  </a:cubicBezTo>
+                  <a:close/>
+                </a:path>
+              </a:pathLst>
+            </a:custGeom>
+            <a:gradFill flip="none" rotWithShape="1">
+              <a:gsLst>
+                <a:gs pos="0">
+                  <a:schemeClr val="bg1">
+                    <a:shade val="67500"/>
+                    <a:satMod val="115000"/>
+                  </a:schemeClr>
+                </a:gs>
+                <a:gs pos="100000">
+                  <a:schemeClr val="bg1">
+                    <a:shade val="100000"/>
+                    <a:satMod val="115000"/>
+                  </a:schemeClr>
+                </a:gs>
+              </a:gsLst>
+              <a:lin ang="10800000" scaled="1"/>
+              <a:tileRect/>
+            </a:gradFill>
+            <a:ln>
+              <a:noFill/>
+            </a:ln>
+            <a:effectLst>
+              <a:outerShdw blurRad="88900" dist="139700" dir="5400000" sx="98000" sy="98000" algn="t" rotWithShape="0">
+                <a:prstClr val="black">
+                  <a:alpha val="40000"/>
+                </a:prstClr>
+              </a:outerShdw>
+            </a:effectLst>
+          </p:spPr>
+          <p:style>
+            <a:lnRef idx="2">
+              <a:schemeClr val="accent1">
+                <a:shade val="50000"/>
+              </a:schemeClr>
+            </a:lnRef>
+            <a:fillRef idx="1">
+              <a:schemeClr val="accent1"/>
+            </a:fillRef>
+            <a:effectRef idx="0">
+              <a:schemeClr val="accent1"/>
+            </a:effectRef>
+            <a:fontRef idx="minor">
+              <a:schemeClr val="lt1"/>
+            </a:fontRef>
+          </p:style>
+          <p:txBody>
+            <a:bodyPr rtlCol="0" anchor="ctr"/>
+            <a:lstStyle/>
+            <a:p>
+              <a:pPr algn="ctr" latinLnBrk="0">
+                <a:buClr>
+                  <a:srgbClr val="000000"/>
+                </a:buClr>
+                <a:buFont typeface="Arial"/>
+                <a:buNone/>
+              </a:pPr>
+              <a:endParaRPr lang="ko-KR" altLang="en-US" sz="2400" kern="0">
+                <a:solidFill>
+                  <a:srgbClr val="FFFFFF"/>
+                </a:solidFill>
+                <a:sym typeface="Arial"/>
+              </a:endParaRPr>
+            </a:p>
+          </p:txBody>
+        </p:sp>
+      </p:grpSp>
+      <p:graphicFrame>
+        <p:nvGraphicFramePr>
+          <p:cNvPr id="4" name="표 3"/>
+          <p:cNvGraphicFramePr>
+            <a:graphicFrameLocks noGrp="1"/>
+          </p:cNvGraphicFramePr>
+          <p:nvPr>
+            <p:extLst/>
+          </p:nvPr>
+        </p:nvGraphicFramePr>
+        <p:xfrm>
+          <a:off x="9168341" y="1433634"/>
+          <a:ext cx="2688299" cy="915066"/>
+        </p:xfrm>
+        <a:graphic>
+          <a:graphicData uri="http://schemas.openxmlformats.org/drawingml/2006/table">
+            <a:tbl>
+              <a:tblPr firstRow="1" bandRow="1"/>
+              <a:tblGrid>
+                <a:gridCol w="2688299"/>
+              </a:tblGrid>
+              <a:tr h="424495">
+                <a:tc>
+                  <a:txBody>
+                    <a:bodyPr/>
+                    <a:lstStyle/>
+                    <a:p>
+                      <a:pPr algn="ctr" latinLnBrk="1"/>
+                      <a:r>
+                        <a:rPr lang="ko-KR" altLang="en-US" sz="1200" b="1" dirty="0" smtClean="0">
+                          <a:solidFill>
+                            <a:schemeClr val="tx1"/>
+                          </a:solidFill>
+                          <a:latin typeface="+mj-ea"/>
+                          <a:ea typeface="+mj-ea"/>
+                        </a:rPr>
+                        <a:t>화면코드</a:t>
+                      </a:r>
+                      <a:endParaRPr lang="ko-KR" altLang="en-US" sz="1200" b="1" dirty="0">
+                        <a:solidFill>
+                          <a:schemeClr val="tx1"/>
+                        </a:solidFill>
+                        <a:latin typeface="+mj-ea"/>
+                        <a:ea typeface="+mj-ea"/>
+                      </a:endParaRPr>
+                    </a:p>
+                  </a:txBody>
+                  <a:tcPr marL="121920" marR="121920" marT="60960" marB="60960" anchor="ctr">
+                    <a:solidFill>
+                      <a:srgbClr val="FF9E00"/>
+                    </a:solidFill>
+                  </a:tcPr>
+                </a:tc>
+              </a:tr>
+              <a:tr h="490571">
+                <a:tc>
+                  <a:txBody>
+                    <a:bodyPr/>
+                    <a:lstStyle/>
+                    <a:p>
+                      <a:pPr algn="ctr" latinLnBrk="1"/>
+                      <a:r>
+                        <a:rPr lang="en-US" altLang="ko-KR" sz="1500" b="0" i="0" u="none" strike="noStrike" cap="none" dirty="0" err="1" smtClean="0">
+                          <a:solidFill>
+                            <a:schemeClr val="tx1"/>
+                          </a:solidFill>
+                          <a:latin typeface="+mj-ea"/>
+                          <a:ea typeface="+mn-ea"/>
+                          <a:cs typeface="+mn-cs"/>
+                          <a:sym typeface="Arial"/>
+                        </a:rPr>
+                        <a:t>mk_user_m_projectList</a:t>
+                      </a:r>
+                      <a:endParaRPr lang="ko-KR" altLang="en-US" sz="1500" dirty="0">
+                        <a:latin typeface="+mj-ea"/>
+                        <a:ea typeface="+mj-ea"/>
+                      </a:endParaRPr>
+                    </a:p>
+                  </a:txBody>
+                  <a:tcPr marL="121920" marR="121920" marT="60960" marB="60960" anchor="ctr"/>
+                </a:tc>
+              </a:tr>
+            </a:tbl>
+          </a:graphicData>
+        </a:graphic>
+      </p:graphicFrame>
+      <p:sp>
+        <p:nvSpPr>
+          <p:cNvPr id="19" name="직사각형 18"/>
+          <p:cNvSpPr/>
+          <p:nvPr/>
+        </p:nvSpPr>
+        <p:spPr>
+          <a:xfrm>
+            <a:off x="1081171" y="1433635"/>
+            <a:ext cx="7895148" cy="4875687"/>
+          </a:xfrm>
+          <a:prstGeom prst="rect">
+            <a:avLst/>
+          </a:prstGeom>
+          <a:noFill/>
+          <a:ln w="9525">
+            <a:solidFill>
+              <a:schemeClr val="tx1"/>
+            </a:solidFill>
+          </a:ln>
+        </p:spPr>
+        <p:style>
+          <a:lnRef idx="2">
+            <a:schemeClr val="accent1">
+              <a:shade val="50000"/>
+            </a:schemeClr>
+          </a:lnRef>
+          <a:fillRef idx="1">
+            <a:schemeClr val="accent1"/>
+          </a:fillRef>
+          <a:effectRef idx="0">
+            <a:schemeClr val="accent1"/>
+          </a:effectRef>
+          <a:fontRef idx="minor">
+            <a:schemeClr val="lt1"/>
+          </a:fontRef>
+        </p:style>
+        <p:txBody>
+          <a:bodyPr lIns="91440" tIns="45720" rIns="91440" bIns="45720" rtlCol="0" anchor="ctr"/>
+          <a:lstStyle/>
+          <a:p>
+            <a:pPr algn="ctr" latinLnBrk="0">
+              <a:buClr>
+                <a:srgbClr val="000000"/>
+              </a:buClr>
+              <a:buFont typeface="Arial"/>
+              <a:buNone/>
+            </a:pPr>
+            <a:endParaRPr lang="ko-KR" altLang="en-US" sz="2400" kern="0">
+              <a:noFill/>
+              <a:sym typeface="Arial"/>
+            </a:endParaRPr>
+          </a:p>
+        </p:txBody>
+      </p:sp>
+      <p:sp>
+        <p:nvSpPr>
+          <p:cNvPr id="27" name="직사각형 26"/>
+          <p:cNvSpPr/>
+          <p:nvPr/>
+        </p:nvSpPr>
+        <p:spPr>
+          <a:xfrm>
+            <a:off x="2258062" y="711465"/>
+            <a:ext cx="8789911" cy="553998"/>
+          </a:xfrm>
+          <a:prstGeom prst="rect">
+            <a:avLst/>
+          </a:prstGeom>
+        </p:spPr>
+        <p:txBody>
+          <a:bodyPr wrap="square" lIns="91440" tIns="45720" rIns="91440" bIns="45720">
+            <a:spAutoFit/>
+          </a:bodyPr>
+          <a:lstStyle/>
+          <a:p>
+            <a:pPr latinLnBrk="0">
+              <a:lnSpc>
+                <a:spcPct val="150000"/>
+              </a:lnSpc>
+              <a:buClr>
+                <a:srgbClr val="000000"/>
+              </a:buClr>
+              <a:buFont typeface="Arial"/>
+              <a:buNone/>
+            </a:pPr>
+            <a:r>
+              <a:rPr lang="en-US" altLang="ko-KR" sz="2000" b="1" kern="0" dirty="0">
+                <a:solidFill>
+                  <a:srgbClr val="000000">
+                    <a:lumMod val="75000"/>
+                    <a:lumOff val="25000"/>
+                  </a:srgbClr>
+                </a:solidFill>
+                <a:latin typeface="맑은 고딕" panose="020B0503020000020004" pitchFamily="50" charset="-127"/>
+                <a:cs typeface="Arial"/>
+                <a:sym typeface="Arial"/>
+              </a:rPr>
+              <a:t>[ </a:t>
+            </a:r>
+            <a:r>
+              <a:rPr lang="ko-KR" altLang="en-US" sz="2000" b="1" kern="0" dirty="0">
+                <a:solidFill>
+                  <a:srgbClr val="000000">
+                    <a:lumMod val="75000"/>
+                    <a:lumOff val="25000"/>
+                  </a:srgbClr>
+                </a:solidFill>
+                <a:latin typeface="맑은 고딕" panose="020B0503020000020004" pitchFamily="50" charset="-127"/>
+                <a:cs typeface="Arial"/>
+                <a:sym typeface="Arial"/>
+              </a:rPr>
+              <a:t>화면설계 </a:t>
+            </a:r>
+            <a:r>
+              <a:rPr lang="en-US" altLang="ko-KR" sz="2000" b="1" kern="0" dirty="0">
+                <a:solidFill>
+                  <a:srgbClr val="000000">
+                    <a:lumMod val="75000"/>
+                    <a:lumOff val="25000"/>
+                  </a:srgbClr>
+                </a:solidFill>
+                <a:latin typeface="맑은 고딕" panose="020B0503020000020004" pitchFamily="50" charset="-127"/>
+                <a:cs typeface="Arial"/>
+                <a:sym typeface="Arial"/>
+              </a:rPr>
+              <a:t>] </a:t>
+            </a:r>
+            <a:r>
+              <a:rPr lang="ko-KR" altLang="en-US" sz="2000" b="1" kern="0" dirty="0">
+                <a:solidFill>
+                  <a:srgbClr val="000000">
+                    <a:lumMod val="75000"/>
+                    <a:lumOff val="25000"/>
+                  </a:srgbClr>
+                </a:solidFill>
+                <a:latin typeface="맑은 고딕" panose="020B0503020000020004" pitchFamily="50" charset="-127"/>
+                <a:cs typeface="Arial"/>
+                <a:sym typeface="Arial"/>
+              </a:rPr>
+              <a:t>프로젝트 </a:t>
+            </a:r>
+            <a:r>
+              <a:rPr lang="ko-KR" altLang="en-US" sz="2000" b="1" kern="0" dirty="0" smtClean="0">
+                <a:solidFill>
+                  <a:srgbClr val="000000">
+                    <a:lumMod val="75000"/>
+                    <a:lumOff val="25000"/>
+                  </a:srgbClr>
+                </a:solidFill>
+                <a:latin typeface="맑은 고딕" panose="020B0503020000020004" pitchFamily="50" charset="-127"/>
+                <a:cs typeface="Arial"/>
+                <a:sym typeface="Arial"/>
+              </a:rPr>
+              <a:t>목록 </a:t>
+            </a:r>
+            <a:r>
+              <a:rPr lang="en-US" altLang="ko-KR" sz="2000" b="1" kern="0" dirty="0" smtClean="0">
+                <a:solidFill>
+                  <a:srgbClr val="000000">
+                    <a:lumMod val="75000"/>
+                    <a:lumOff val="25000"/>
+                  </a:srgbClr>
+                </a:solidFill>
+                <a:latin typeface="맑은 고딕" panose="020B0503020000020004" pitchFamily="50" charset="-127"/>
+                <a:cs typeface="Arial"/>
+                <a:sym typeface="Arial"/>
+              </a:rPr>
+              <a:t>– </a:t>
+            </a:r>
+            <a:r>
+              <a:rPr lang="ko-KR" altLang="en-US" sz="2000" b="1" kern="0" dirty="0" err="1" smtClean="0">
+                <a:solidFill>
+                  <a:srgbClr val="000000">
+                    <a:lumMod val="75000"/>
+                    <a:lumOff val="25000"/>
+                  </a:srgbClr>
+                </a:solidFill>
+                <a:latin typeface="맑은 고딕" panose="020B0503020000020004" pitchFamily="50" charset="-127"/>
+                <a:cs typeface="Arial"/>
+                <a:sym typeface="Arial"/>
+              </a:rPr>
+              <a:t>펀딩</a:t>
+            </a:r>
+            <a:r>
+              <a:rPr lang="ko-KR" altLang="en-US" sz="2000" b="1" kern="0" dirty="0" smtClean="0">
+                <a:solidFill>
+                  <a:srgbClr val="000000">
+                    <a:lumMod val="75000"/>
+                    <a:lumOff val="25000"/>
+                  </a:srgbClr>
+                </a:solidFill>
+                <a:latin typeface="맑은 고딕" panose="020B0503020000020004" pitchFamily="50" charset="-127"/>
+                <a:cs typeface="Arial"/>
+                <a:sym typeface="Arial"/>
+              </a:rPr>
+              <a:t> </a:t>
+            </a:r>
+            <a:r>
+              <a:rPr lang="en-US" altLang="ko-KR" sz="2000" b="1" kern="0" dirty="0" smtClean="0">
+                <a:solidFill>
+                  <a:srgbClr val="000000">
+                    <a:lumMod val="75000"/>
+                    <a:lumOff val="25000"/>
+                  </a:srgbClr>
+                </a:solidFill>
+                <a:latin typeface="맑은 고딕" panose="020B0503020000020004" pitchFamily="50" charset="-127"/>
+                <a:cs typeface="Arial"/>
+                <a:sym typeface="Arial"/>
+              </a:rPr>
+              <a:t>– </a:t>
+            </a:r>
+            <a:r>
+              <a:rPr lang="ko-KR" altLang="en-US" sz="2000" b="1" kern="0" dirty="0" smtClean="0">
+                <a:solidFill>
+                  <a:srgbClr val="000000">
+                    <a:lumMod val="75000"/>
+                    <a:lumOff val="25000"/>
+                  </a:srgbClr>
+                </a:solidFill>
+                <a:latin typeface="맑은 고딕" panose="020B0503020000020004" pitchFamily="50" charset="-127"/>
+                <a:cs typeface="Arial"/>
+                <a:sym typeface="Arial"/>
+              </a:rPr>
+              <a:t>사용자</a:t>
+            </a:r>
+            <a:endParaRPr lang="ko-KR" altLang="en-US" sz="2000" b="1" kern="0" dirty="0">
+              <a:solidFill>
+                <a:srgbClr val="000000">
+                  <a:lumMod val="75000"/>
+                  <a:lumOff val="25000"/>
+                </a:srgbClr>
+              </a:solidFill>
+              <a:latin typeface="맑은 고딕" panose="020B0503020000020004" pitchFamily="50" charset="-127"/>
+              <a:cs typeface="Arial"/>
+              <a:sym typeface="Arial"/>
+            </a:endParaRPr>
+          </a:p>
+        </p:txBody>
+      </p:sp>
+      <p:pic>
+        <p:nvPicPr>
+          <p:cNvPr id="2050" name="Picture 2"/>
+          <p:cNvPicPr>
+            <a:picLocks noChangeAspect="1" noChangeArrowheads="1"/>
+          </p:cNvPicPr>
+          <p:nvPr/>
+        </p:nvPicPr>
+        <p:blipFill>
+          <a:blip r:embed="rId2" cstate="print">
+            <a:extLst>
+              <a:ext uri="{28A0092B-C50C-407E-A947-70E740481C1C}">
+                <a14:useLocalDpi xmlns:a14="http://schemas.microsoft.com/office/drawing/2010/main" val="0"/>
+              </a:ext>
+            </a:extLst>
+          </a:blip>
+          <a:srcRect/>
+          <a:stretch>
+            <a:fillRect/>
+          </a:stretch>
+        </p:blipFill>
+        <p:spPr bwMode="auto">
+          <a:xfrm>
+            <a:off x="1081171" y="604904"/>
+            <a:ext cx="1151805" cy="767120"/>
+          </a:xfrm>
+          <a:prstGeom prst="rect">
+            <a:avLst/>
+          </a:prstGeom>
+          <a:noFill/>
+          <a:ln>
+            <a:noFill/>
+          </a:ln>
+          <a:extLst>
+            <a:ext uri="{909E8E84-426E-40DD-AFC4-6F175D3DCCD1}">
+              <a14:hiddenFill xmlns:a14="http://schemas.microsoft.com/office/drawing/2010/main">
+                <a:solidFill>
+                  <a:schemeClr val="accent1"/>
+                </a:solidFill>
+              </a14:hiddenFill>
+            </a:ext>
+            <a:ext uri="{91240B29-F687-4F45-9708-019B960494DF}">
+              <a14:hiddenLine xmlns:a14="http://schemas.microsoft.com/office/drawing/2010/main" w="9525">
+                <a:solidFill>
+                  <a:schemeClr val="tx1"/>
+                </a:solidFill>
+                <a:miter lim="800000"/>
+                <a:headEnd/>
+                <a:tailEnd/>
+              </a14:hiddenLine>
+            </a:ext>
+          </a:extLst>
+        </p:spPr>
+      </p:pic>
+      <p:grpSp>
+        <p:nvGrpSpPr>
+          <p:cNvPr id="6" name="그룹 5"/>
+          <p:cNvGrpSpPr/>
+          <p:nvPr/>
+        </p:nvGrpSpPr>
+        <p:grpSpPr>
+          <a:xfrm>
+            <a:off x="3404341" y="1475599"/>
+            <a:ext cx="3248809" cy="4791755"/>
+            <a:chOff x="3398699" y="1475599"/>
+            <a:chExt cx="3248809" cy="4791755"/>
+          </a:xfrm>
+        </p:grpSpPr>
+        <p:sp>
+          <p:nvSpPr>
+            <p:cNvPr id="17" name="직사각형 16"/>
+            <p:cNvSpPr/>
+            <p:nvPr/>
+          </p:nvSpPr>
+          <p:spPr>
+            <a:xfrm>
+              <a:off x="3398699" y="1475599"/>
+              <a:ext cx="3248809" cy="4791755"/>
+            </a:xfrm>
+            <a:prstGeom prst="rect">
+              <a:avLst/>
+            </a:prstGeom>
+          </p:spPr>
+          <p:style>
+            <a:lnRef idx="2">
+              <a:schemeClr val="dk1"/>
+            </a:lnRef>
+            <a:fillRef idx="1">
+              <a:schemeClr val="lt1"/>
+            </a:fillRef>
+            <a:effectRef idx="0">
+              <a:schemeClr val="dk1"/>
+            </a:effectRef>
+            <a:fontRef idx="minor">
+              <a:schemeClr val="dk1"/>
+            </a:fontRef>
+          </p:style>
+          <p:txBody>
+            <a:bodyPr rtlCol="0" anchor="ctr"/>
+            <a:lstStyle/>
+            <a:p>
+              <a:pPr algn="ctr"/>
+              <a:endParaRPr lang="ko-KR" altLang="en-US">
+                <a:solidFill>
+                  <a:srgbClr val="000000"/>
+                </a:solidFill>
+              </a:endParaRPr>
+            </a:p>
+          </p:txBody>
+        </p:sp>
+        <p:sp>
+          <p:nvSpPr>
+            <p:cNvPr id="20" name="직사각형 19"/>
+            <p:cNvSpPr/>
+            <p:nvPr/>
+          </p:nvSpPr>
+          <p:spPr>
+            <a:xfrm>
+              <a:off x="3499103" y="1622131"/>
+              <a:ext cx="3048000" cy="511550"/>
+            </a:xfrm>
+            <a:prstGeom prst="rect">
+              <a:avLst/>
+            </a:prstGeom>
+          </p:spPr>
+          <p:style>
+            <a:lnRef idx="2">
+              <a:schemeClr val="dk1"/>
+            </a:lnRef>
+            <a:fillRef idx="1">
+              <a:schemeClr val="lt1"/>
+            </a:fillRef>
+            <a:effectRef idx="0">
+              <a:schemeClr val="dk1"/>
+            </a:effectRef>
+            <a:fontRef idx="minor">
+              <a:schemeClr val="dk1"/>
+            </a:fontRef>
+          </p:style>
+          <p:txBody>
+            <a:bodyPr rtlCol="0" anchor="ctr"/>
+            <a:lstStyle/>
+            <a:p>
+              <a:pPr algn="ctr"/>
+              <a:r>
+                <a:rPr lang="ko-KR" altLang="en-US" dirty="0" smtClean="0">
+                  <a:solidFill>
+                    <a:srgbClr val="000000"/>
+                  </a:solidFill>
+                </a:rPr>
+                <a:t>카테고리</a:t>
+              </a:r>
+              <a:endParaRPr lang="ko-KR" altLang="en-US" dirty="0">
+                <a:solidFill>
+                  <a:srgbClr val="000000"/>
+                </a:solidFill>
+              </a:endParaRPr>
+            </a:p>
+          </p:txBody>
+        </p:sp>
+        <p:sp>
+          <p:nvSpPr>
+            <p:cNvPr id="21" name="직사각형 20"/>
+            <p:cNvSpPr/>
+            <p:nvPr/>
+          </p:nvSpPr>
+          <p:spPr>
+            <a:xfrm>
+              <a:off x="3499103" y="2876158"/>
+              <a:ext cx="3048000" cy="941030"/>
+            </a:xfrm>
+            <a:prstGeom prst="rect">
+              <a:avLst/>
+            </a:prstGeom>
+          </p:spPr>
+          <p:style>
+            <a:lnRef idx="2">
+              <a:schemeClr val="dk1"/>
+            </a:lnRef>
+            <a:fillRef idx="1">
+              <a:schemeClr val="lt1"/>
+            </a:fillRef>
+            <a:effectRef idx="0">
+              <a:schemeClr val="dk1"/>
+            </a:effectRef>
+            <a:fontRef idx="minor">
+              <a:schemeClr val="dk1"/>
+            </a:fontRef>
+          </p:style>
+          <p:txBody>
+            <a:bodyPr rtlCol="0" anchor="ctr"/>
+            <a:lstStyle/>
+            <a:p>
+              <a:pPr algn="ctr"/>
+              <a:r>
+                <a:rPr lang="ko-KR" altLang="en-US" smtClean="0">
+                  <a:solidFill>
+                    <a:srgbClr val="000000"/>
+                  </a:solidFill>
+                </a:rPr>
+                <a:t>프로젝트</a:t>
+              </a:r>
+              <a:endParaRPr lang="ko-KR" altLang="en-US">
+                <a:solidFill>
+                  <a:srgbClr val="000000"/>
+                </a:solidFill>
+              </a:endParaRPr>
+            </a:p>
+          </p:txBody>
+        </p:sp>
+        <p:sp>
+          <p:nvSpPr>
+            <p:cNvPr id="22" name="직사각형 21"/>
+            <p:cNvSpPr/>
+            <p:nvPr/>
+          </p:nvSpPr>
+          <p:spPr>
+            <a:xfrm>
+              <a:off x="3499103" y="4001579"/>
+              <a:ext cx="3048000" cy="941030"/>
+            </a:xfrm>
+            <a:prstGeom prst="rect">
+              <a:avLst/>
+            </a:prstGeom>
+          </p:spPr>
+          <p:style>
+            <a:lnRef idx="2">
+              <a:schemeClr val="dk1"/>
+            </a:lnRef>
+            <a:fillRef idx="1">
+              <a:schemeClr val="lt1"/>
+            </a:fillRef>
+            <a:effectRef idx="0">
+              <a:schemeClr val="dk1"/>
+            </a:effectRef>
+            <a:fontRef idx="minor">
+              <a:schemeClr val="dk1"/>
+            </a:fontRef>
+          </p:style>
+          <p:txBody>
+            <a:bodyPr rtlCol="0" anchor="ctr"/>
+            <a:lstStyle/>
+            <a:p>
+              <a:pPr algn="ctr"/>
+              <a:r>
+                <a:rPr lang="ko-KR" altLang="en-US" dirty="0" smtClean="0">
+                  <a:solidFill>
+                    <a:srgbClr val="000000"/>
+                  </a:solidFill>
+                </a:rPr>
+                <a:t>프로젝트</a:t>
+              </a:r>
+              <a:endParaRPr lang="ko-KR" altLang="en-US" dirty="0">
+                <a:solidFill>
+                  <a:srgbClr val="000000"/>
+                </a:solidFill>
+              </a:endParaRPr>
+            </a:p>
+          </p:txBody>
+        </p:sp>
+        <p:sp>
+          <p:nvSpPr>
+            <p:cNvPr id="23" name="직사각형 22"/>
+            <p:cNvSpPr/>
+            <p:nvPr/>
+          </p:nvSpPr>
+          <p:spPr>
+            <a:xfrm>
+              <a:off x="3499182" y="5127342"/>
+              <a:ext cx="3048000" cy="941030"/>
+            </a:xfrm>
+            <a:prstGeom prst="rect">
+              <a:avLst/>
+            </a:prstGeom>
+          </p:spPr>
+          <p:style>
+            <a:lnRef idx="2">
+              <a:schemeClr val="dk1"/>
+            </a:lnRef>
+            <a:fillRef idx="1">
+              <a:schemeClr val="lt1"/>
+            </a:fillRef>
+            <a:effectRef idx="0">
+              <a:schemeClr val="dk1"/>
+            </a:effectRef>
+            <a:fontRef idx="minor">
+              <a:schemeClr val="dk1"/>
+            </a:fontRef>
+          </p:style>
+          <p:txBody>
+            <a:bodyPr rtlCol="0" anchor="ctr"/>
+            <a:lstStyle/>
+            <a:p>
+              <a:pPr algn="ctr"/>
+              <a:r>
+                <a:rPr lang="ko-KR" altLang="en-US" smtClean="0">
+                  <a:solidFill>
+                    <a:srgbClr val="000000"/>
+                  </a:solidFill>
+                </a:rPr>
+                <a:t>프로젝트</a:t>
+              </a:r>
+              <a:endParaRPr lang="ko-KR" altLang="en-US">
+                <a:solidFill>
+                  <a:srgbClr val="000000"/>
+                </a:solidFill>
+              </a:endParaRPr>
+            </a:p>
+          </p:txBody>
+        </p:sp>
+        <p:sp>
+          <p:nvSpPr>
+            <p:cNvPr id="24" name="직사각형 23"/>
+            <p:cNvSpPr/>
+            <p:nvPr/>
+          </p:nvSpPr>
+          <p:spPr>
+            <a:xfrm>
+              <a:off x="5071103" y="2280213"/>
+              <a:ext cx="1476000" cy="427861"/>
+            </a:xfrm>
+            <a:prstGeom prst="rect">
+              <a:avLst/>
+            </a:prstGeom>
+          </p:spPr>
+          <p:style>
+            <a:lnRef idx="2">
+              <a:schemeClr val="dk1"/>
+            </a:lnRef>
+            <a:fillRef idx="1">
+              <a:schemeClr val="lt1"/>
+            </a:fillRef>
+            <a:effectRef idx="0">
+              <a:schemeClr val="dk1"/>
+            </a:effectRef>
+            <a:fontRef idx="minor">
+              <a:schemeClr val="dk1"/>
+            </a:fontRef>
+          </p:style>
+          <p:txBody>
+            <a:bodyPr rtlCol="0" anchor="ctr"/>
+            <a:lstStyle/>
+            <a:p>
+              <a:pPr algn="ctr"/>
+              <a:r>
+                <a:rPr lang="ko-KR" altLang="en-US" dirty="0" smtClean="0">
+                  <a:solidFill>
+                    <a:srgbClr val="000000"/>
+                  </a:solidFill>
+                </a:rPr>
+                <a:t>정렬</a:t>
+              </a:r>
+              <a:endParaRPr lang="ko-KR" altLang="en-US" dirty="0">
+                <a:solidFill>
+                  <a:srgbClr val="000000"/>
+                </a:solidFill>
+              </a:endParaRPr>
+            </a:p>
+          </p:txBody>
+        </p:sp>
+        <p:sp>
+          <p:nvSpPr>
+            <p:cNvPr id="25" name="직사각형 24"/>
+            <p:cNvSpPr/>
+            <p:nvPr/>
+          </p:nvSpPr>
+          <p:spPr>
+            <a:xfrm>
+              <a:off x="3499102" y="2280213"/>
+              <a:ext cx="1476000" cy="427861"/>
+            </a:xfrm>
+            <a:prstGeom prst="rect">
+              <a:avLst/>
+            </a:prstGeom>
+          </p:spPr>
+          <p:style>
+            <a:lnRef idx="2">
+              <a:schemeClr val="dk1"/>
+            </a:lnRef>
+            <a:fillRef idx="1">
+              <a:schemeClr val="lt1"/>
+            </a:fillRef>
+            <a:effectRef idx="0">
+              <a:schemeClr val="dk1"/>
+            </a:effectRef>
+            <a:fontRef idx="minor">
+              <a:schemeClr val="dk1"/>
+            </a:fontRef>
+          </p:style>
+          <p:txBody>
+            <a:bodyPr rtlCol="0" anchor="ctr"/>
+            <a:lstStyle/>
+            <a:p>
+              <a:pPr algn="ctr"/>
+              <a:r>
+                <a:rPr lang="ko-KR" altLang="en-US" dirty="0" smtClean="0">
+                  <a:solidFill>
+                    <a:srgbClr val="000000"/>
+                  </a:solidFill>
+                </a:rPr>
+                <a:t>검색</a:t>
+              </a:r>
+              <a:endParaRPr lang="ko-KR" altLang="en-US" dirty="0">
+                <a:solidFill>
+                  <a:srgbClr val="000000"/>
+                </a:solidFill>
+              </a:endParaRPr>
+            </a:p>
+          </p:txBody>
+        </p:sp>
+      </p:grpSp>
+      <p:sp>
+        <p:nvSpPr>
+          <p:cNvPr id="16" name="직사각형 15"/>
+          <p:cNvSpPr/>
+          <p:nvPr/>
+        </p:nvSpPr>
+        <p:spPr>
+          <a:xfrm>
+            <a:off x="3333629" y="1732849"/>
+            <a:ext cx="347421" cy="290113"/>
+          </a:xfrm>
+          <a:prstGeom prst="rect">
+            <a:avLst/>
+          </a:prstGeom>
+          <a:solidFill>
+            <a:srgbClr val="FF9E00"/>
+          </a:solidFill>
+          <a:ln>
+            <a:noFill/>
+          </a:ln>
+        </p:spPr>
+        <p:style>
+          <a:lnRef idx="2">
+            <a:schemeClr val="accent1">
+              <a:shade val="50000"/>
+            </a:schemeClr>
+          </a:lnRef>
+          <a:fillRef idx="1">
+            <a:schemeClr val="accent1"/>
+          </a:fillRef>
+          <a:effectRef idx="0">
+            <a:schemeClr val="accent1"/>
+          </a:effectRef>
+          <a:fontRef idx="minor">
+            <a:schemeClr val="lt1"/>
+          </a:fontRef>
+        </p:style>
+        <p:txBody>
+          <a:bodyPr rtlCol="0" anchor="ctr"/>
+          <a:lstStyle/>
+          <a:p>
+            <a:pPr algn="ctr" latinLnBrk="0">
+              <a:buClr>
+                <a:srgbClr val="000000"/>
+              </a:buClr>
+              <a:buFont typeface="Arial"/>
+              <a:buNone/>
+            </a:pPr>
+            <a:r>
+              <a:rPr lang="en-US" altLang="ko-KR" sz="1467" b="1" kern="0" dirty="0">
+                <a:solidFill>
+                  <a:srgbClr val="FFFFFF"/>
+                </a:solidFill>
+                <a:sym typeface="Arial"/>
+              </a:rPr>
+              <a:t>1</a:t>
+            </a:r>
+            <a:endParaRPr lang="ko-KR" altLang="en-US" sz="1467" b="1" kern="0" dirty="0">
+              <a:solidFill>
+                <a:srgbClr val="FFFFFF"/>
+              </a:solidFill>
+              <a:sym typeface="Arial"/>
+            </a:endParaRPr>
+          </a:p>
+        </p:txBody>
+      </p:sp>
+      <p:sp>
+        <p:nvSpPr>
+          <p:cNvPr id="26" name="직사각형 25"/>
+          <p:cNvSpPr/>
+          <p:nvPr/>
+        </p:nvSpPr>
+        <p:spPr>
+          <a:xfrm>
+            <a:off x="3333629" y="2358419"/>
+            <a:ext cx="347421" cy="290113"/>
+          </a:xfrm>
+          <a:prstGeom prst="rect">
+            <a:avLst/>
+          </a:prstGeom>
+          <a:solidFill>
+            <a:srgbClr val="FF9E00"/>
+          </a:solidFill>
+          <a:ln>
+            <a:noFill/>
+          </a:ln>
+        </p:spPr>
+        <p:style>
+          <a:lnRef idx="2">
+            <a:schemeClr val="accent1">
+              <a:shade val="50000"/>
+            </a:schemeClr>
+          </a:lnRef>
+          <a:fillRef idx="1">
+            <a:schemeClr val="accent1"/>
+          </a:fillRef>
+          <a:effectRef idx="0">
+            <a:schemeClr val="accent1"/>
+          </a:effectRef>
+          <a:fontRef idx="minor">
+            <a:schemeClr val="lt1"/>
+          </a:fontRef>
+        </p:style>
+        <p:txBody>
+          <a:bodyPr rtlCol="0" anchor="ctr"/>
+          <a:lstStyle/>
+          <a:p>
+            <a:pPr algn="ctr" latinLnBrk="0">
+              <a:buClr>
+                <a:srgbClr val="000000"/>
+              </a:buClr>
+              <a:buFont typeface="Arial"/>
+              <a:buNone/>
+            </a:pPr>
+            <a:r>
+              <a:rPr lang="en-US" altLang="ko-KR" sz="1467" b="1" kern="0" dirty="0" smtClean="0">
+                <a:solidFill>
+                  <a:srgbClr val="FFFFFF"/>
+                </a:solidFill>
+                <a:sym typeface="Arial"/>
+              </a:rPr>
+              <a:t>3</a:t>
+            </a:r>
+            <a:endParaRPr lang="ko-KR" altLang="en-US" sz="1467" b="1" kern="0" dirty="0">
+              <a:solidFill>
+                <a:srgbClr val="FFFFFF"/>
+              </a:solidFill>
+              <a:sym typeface="Arial"/>
+            </a:endParaRPr>
+          </a:p>
+        </p:txBody>
+      </p:sp>
+      <p:sp>
+        <p:nvSpPr>
+          <p:cNvPr id="28" name="직사각형 27"/>
+          <p:cNvSpPr/>
+          <p:nvPr/>
+        </p:nvSpPr>
+        <p:spPr>
+          <a:xfrm>
+            <a:off x="3333629" y="3198258"/>
+            <a:ext cx="347421" cy="290113"/>
+          </a:xfrm>
+          <a:prstGeom prst="rect">
+            <a:avLst/>
+          </a:prstGeom>
+          <a:solidFill>
+            <a:srgbClr val="FF9E00"/>
+          </a:solidFill>
+          <a:ln>
+            <a:noFill/>
+          </a:ln>
+        </p:spPr>
+        <p:style>
+          <a:lnRef idx="2">
+            <a:schemeClr val="accent1">
+              <a:shade val="50000"/>
+            </a:schemeClr>
+          </a:lnRef>
+          <a:fillRef idx="1">
+            <a:schemeClr val="accent1"/>
+          </a:fillRef>
+          <a:effectRef idx="0">
+            <a:schemeClr val="accent1"/>
+          </a:effectRef>
+          <a:fontRef idx="minor">
+            <a:schemeClr val="lt1"/>
+          </a:fontRef>
+        </p:style>
+        <p:txBody>
+          <a:bodyPr rtlCol="0" anchor="ctr"/>
+          <a:lstStyle/>
+          <a:p>
+            <a:pPr algn="ctr" latinLnBrk="0">
+              <a:buClr>
+                <a:srgbClr val="000000"/>
+              </a:buClr>
+              <a:buFont typeface="Arial"/>
+              <a:buNone/>
+            </a:pPr>
+            <a:r>
+              <a:rPr lang="en-US" altLang="ko-KR" sz="1467" b="1" kern="0" dirty="0" smtClean="0">
+                <a:solidFill>
+                  <a:srgbClr val="FFFFFF"/>
+                </a:solidFill>
+                <a:sym typeface="Arial"/>
+              </a:rPr>
+              <a:t>2</a:t>
+            </a:r>
+            <a:endParaRPr lang="ko-KR" altLang="en-US" sz="1467" b="1" kern="0" dirty="0">
+              <a:solidFill>
+                <a:srgbClr val="FFFFFF"/>
+              </a:solidFill>
+              <a:sym typeface="Arial"/>
+            </a:endParaRPr>
+          </a:p>
+        </p:txBody>
+      </p:sp>
+      <p:sp>
+        <p:nvSpPr>
+          <p:cNvPr id="29" name="직사각형 28"/>
+          <p:cNvSpPr/>
+          <p:nvPr/>
+        </p:nvSpPr>
+        <p:spPr>
+          <a:xfrm>
+            <a:off x="6378325" y="2358419"/>
+            <a:ext cx="347421" cy="290113"/>
+          </a:xfrm>
+          <a:prstGeom prst="rect">
+            <a:avLst/>
+          </a:prstGeom>
+          <a:solidFill>
+            <a:srgbClr val="FF9E00"/>
+          </a:solidFill>
+          <a:ln>
+            <a:noFill/>
+          </a:ln>
+        </p:spPr>
+        <p:style>
+          <a:lnRef idx="2">
+            <a:schemeClr val="accent1">
+              <a:shade val="50000"/>
+            </a:schemeClr>
+          </a:lnRef>
+          <a:fillRef idx="1">
+            <a:schemeClr val="accent1"/>
+          </a:fillRef>
+          <a:effectRef idx="0">
+            <a:schemeClr val="accent1"/>
+          </a:effectRef>
+          <a:fontRef idx="minor">
+            <a:schemeClr val="lt1"/>
+          </a:fontRef>
+        </p:style>
+        <p:txBody>
+          <a:bodyPr rtlCol="0" anchor="ctr"/>
+          <a:lstStyle/>
+          <a:p>
+            <a:pPr algn="ctr" latinLnBrk="0">
+              <a:buClr>
+                <a:srgbClr val="000000"/>
+              </a:buClr>
+              <a:buFont typeface="Arial"/>
+              <a:buNone/>
+            </a:pPr>
+            <a:r>
+              <a:rPr lang="en-US" altLang="ko-KR" sz="1467" b="1" kern="0" dirty="0" smtClean="0">
+                <a:solidFill>
+                  <a:srgbClr val="FFFFFF"/>
+                </a:solidFill>
+                <a:sym typeface="Arial"/>
+              </a:rPr>
+              <a:t>4</a:t>
+            </a:r>
+            <a:endParaRPr lang="ko-KR" altLang="en-US" sz="1467" b="1" kern="0" dirty="0">
+              <a:solidFill>
+                <a:srgbClr val="FFFFFF"/>
+              </a:solidFill>
+              <a:sym typeface="Arial"/>
+            </a:endParaRPr>
+          </a:p>
+        </p:txBody>
+      </p:sp>
+      <p:graphicFrame>
+        <p:nvGraphicFramePr>
+          <p:cNvPr id="31" name="표 30"/>
+          <p:cNvGraphicFramePr>
+            <a:graphicFrameLocks noGrp="1"/>
+          </p:cNvGraphicFramePr>
+          <p:nvPr>
+            <p:extLst/>
+          </p:nvPr>
+        </p:nvGraphicFramePr>
+        <p:xfrm>
+          <a:off x="9168341" y="2479153"/>
+          <a:ext cx="2688299" cy="3830170"/>
+        </p:xfrm>
+        <a:graphic>
+          <a:graphicData uri="http://schemas.openxmlformats.org/drawingml/2006/table">
+            <a:tbl>
+              <a:tblPr firstRow="1" bandRow="1"/>
+              <a:tblGrid>
+                <a:gridCol w="280507"/>
+                <a:gridCol w="2407792"/>
+              </a:tblGrid>
+              <a:tr h="492822">
+                <a:tc>
+                  <a:txBody>
+                    <a:bodyPr/>
+                    <a:lstStyle/>
+                    <a:p>
+                      <a:pPr algn="ctr" latinLnBrk="1"/>
+                      <a:r>
+                        <a:rPr lang="en-US" altLang="ko-KR" sz="1200" b="1" dirty="0" smtClean="0">
+                          <a:latin typeface="+mj-ea"/>
+                          <a:ea typeface="+mj-ea"/>
+                        </a:rPr>
+                        <a:t>#</a:t>
+                      </a:r>
+                      <a:endParaRPr lang="ko-KR" altLang="en-US" sz="1200" b="1" dirty="0">
+                        <a:latin typeface="+mj-ea"/>
+                        <a:ea typeface="+mj-ea"/>
+                      </a:endParaRPr>
+                    </a:p>
+                  </a:txBody>
+                  <a:tcPr marL="121920" marR="121920" marT="60960" marB="60960" anchor="ctr">
+                    <a:solidFill>
+                      <a:srgbClr val="FF9E00"/>
+                    </a:solidFill>
+                  </a:tcPr>
+                </a:tc>
+                <a:tc>
+                  <a:txBody>
+                    <a:bodyPr/>
+                    <a:lstStyle/>
+                    <a:p>
+                      <a:pPr algn="ctr" latinLnBrk="1"/>
+                      <a:r>
+                        <a:rPr lang="ko-KR" altLang="en-US" sz="1200" b="1" dirty="0" smtClean="0">
+                          <a:latin typeface="+mj-ea"/>
+                          <a:ea typeface="+mj-ea"/>
+                        </a:rPr>
+                        <a:t>기능</a:t>
+                      </a:r>
+                      <a:endParaRPr lang="ko-KR" altLang="en-US" sz="1200" b="1" dirty="0">
+                        <a:latin typeface="+mj-ea"/>
+                        <a:ea typeface="+mj-ea"/>
+                      </a:endParaRPr>
+                    </a:p>
+                  </a:txBody>
+                  <a:tcPr marL="121920" marR="121920" marT="60960" marB="60960" anchor="ctr">
+                    <a:solidFill>
+                      <a:srgbClr val="FF9E00"/>
+                    </a:solidFill>
+                  </a:tcPr>
+                </a:tc>
+              </a:tr>
+              <a:tr h="544133">
+                <a:tc>
+                  <a:txBody>
+                    <a:bodyPr/>
+                    <a:lstStyle/>
+                    <a:p>
+                      <a:pPr algn="ctr" latinLnBrk="0"/>
+                      <a:r>
+                        <a:rPr lang="en-US" altLang="ko-KR" sz="1300" dirty="0" smtClean="0">
+                          <a:latin typeface="+mj-ea"/>
+                          <a:ea typeface="+mj-ea"/>
+                        </a:rPr>
+                        <a:t>1</a:t>
+                      </a:r>
+                      <a:endParaRPr lang="ko-KR" altLang="en-US" sz="1300" dirty="0">
+                        <a:latin typeface="+mj-ea"/>
+                        <a:ea typeface="+mj-ea"/>
+                      </a:endParaRPr>
+                    </a:p>
+                  </a:txBody>
+                  <a:tcPr marL="121920" marR="121920" marT="60960" marB="60960" anchor="ctr"/>
+                </a:tc>
+                <a:tc>
+                  <a:txBody>
+                    <a:bodyPr/>
+                    <a:lstStyle/>
+                    <a:p>
+                      <a:pPr algn="l" latinLnBrk="0">
+                        <a:lnSpc>
+                          <a:spcPts val="1300"/>
+                        </a:lnSpc>
+                      </a:pPr>
+                      <a:r>
+                        <a:rPr lang="ko-KR" altLang="en-US" sz="1200" b="1" dirty="0" smtClean="0">
+                          <a:latin typeface="+mj-ea"/>
+                          <a:ea typeface="+mj-ea"/>
+                        </a:rPr>
+                        <a:t>카테고리</a:t>
+                      </a:r>
+                      <a:endParaRPr lang="en-US" altLang="ko-KR" sz="1200" b="1" dirty="0" smtClean="0">
+                        <a:latin typeface="+mj-ea"/>
+                        <a:ea typeface="+mj-ea"/>
+                      </a:endParaRPr>
+                    </a:p>
+                    <a:p>
+                      <a:pPr marL="171450" indent="-171450" algn="l" latinLnBrk="0">
+                        <a:lnSpc>
+                          <a:spcPts val="1300"/>
+                        </a:lnSpc>
+                        <a:buFontTx/>
+                        <a:buChar char="-"/>
+                      </a:pPr>
+                      <a:r>
+                        <a:rPr lang="ko-KR" altLang="en-US" sz="1200" b="0" dirty="0" smtClean="0">
+                          <a:latin typeface="+mj-ea"/>
+                          <a:ea typeface="+mj-ea"/>
+                        </a:rPr>
+                        <a:t>카테고리 분류에 따른 이동</a:t>
+                      </a:r>
+                      <a:endParaRPr lang="ko-KR" altLang="en-US" sz="1200" b="0" dirty="0">
+                        <a:latin typeface="+mj-ea"/>
+                        <a:ea typeface="+mj-ea"/>
+                      </a:endParaRPr>
+                    </a:p>
+                  </a:txBody>
+                  <a:tcPr marL="121920" marR="121920" marT="60960" marB="60960"/>
+                </a:tc>
+              </a:tr>
+              <a:tr h="1015714">
+                <a:tc>
+                  <a:txBody>
+                    <a:bodyPr/>
+                    <a:lstStyle/>
+                    <a:p>
+                      <a:pPr algn="ctr" latinLnBrk="0"/>
+                      <a:r>
+                        <a:rPr lang="en-US" altLang="ko-KR" sz="1300" dirty="0" smtClean="0">
+                          <a:latin typeface="+mj-ea"/>
+                          <a:ea typeface="+mj-ea"/>
+                        </a:rPr>
+                        <a:t>2</a:t>
+                      </a:r>
+                      <a:endParaRPr lang="ko-KR" altLang="en-US" sz="1300" dirty="0">
+                        <a:latin typeface="+mj-ea"/>
+                        <a:ea typeface="+mj-ea"/>
+                      </a:endParaRPr>
+                    </a:p>
+                  </a:txBody>
+                  <a:tcPr marL="121920" marR="121920" marT="60960" marB="60960" anchor="ctr"/>
+                </a:tc>
+                <a:tc>
+                  <a:txBody>
+                    <a:bodyPr/>
+                    <a:lstStyle/>
+                    <a:p>
+                      <a:pPr algn="l" latinLnBrk="1">
+                        <a:lnSpc>
+                          <a:spcPts val="1300"/>
+                        </a:lnSpc>
+                      </a:pPr>
+                      <a:r>
+                        <a:rPr lang="ko-KR" altLang="en-US" sz="1200" b="1" i="0" u="none" strike="noStrike" cap="none" dirty="0" smtClean="0">
+                          <a:solidFill>
+                            <a:srgbClr val="000000"/>
+                          </a:solidFill>
+                          <a:latin typeface="+mj-ea"/>
+                          <a:ea typeface="Arial"/>
+                          <a:cs typeface="Arial"/>
+                          <a:sym typeface="Arial"/>
+                        </a:rPr>
+                        <a:t>프로젝트 목록</a:t>
+                      </a:r>
+                      <a:endParaRPr lang="en-US" altLang="ko-KR" sz="1200" b="1" i="0" u="none" strike="noStrike" cap="none" dirty="0" smtClean="0">
+                        <a:solidFill>
+                          <a:srgbClr val="000000"/>
+                        </a:solidFill>
+                        <a:latin typeface="+mj-ea"/>
+                        <a:ea typeface="Arial"/>
+                        <a:cs typeface="Arial"/>
+                        <a:sym typeface="Arial"/>
+                      </a:endParaRPr>
+                    </a:p>
+                    <a:p>
+                      <a:pPr marL="171450" marR="0" indent="-171450" algn="l" defTabSz="914400" rtl="0" eaLnBrk="1" fontAlgn="auto" latinLnBrk="0" hangingPunct="1">
+                        <a:lnSpc>
+                          <a:spcPts val="1300"/>
+                        </a:lnSpc>
+                        <a:spcBef>
+                          <a:spcPts val="0"/>
+                        </a:spcBef>
+                        <a:spcAft>
+                          <a:spcPts val="0"/>
+                        </a:spcAft>
+                        <a:buClr>
+                          <a:srgbClr val="000000"/>
+                        </a:buClr>
+                        <a:buSzTx/>
+                        <a:buFontTx/>
+                        <a:buChar char="-"/>
+                        <a:tabLst/>
+                        <a:defRPr/>
+                      </a:pPr>
+                      <a:r>
+                        <a:rPr lang="ko-KR" altLang="en-US" sz="1200" b="0" i="0" u="none" strike="noStrike" cap="none" dirty="0" err="1" smtClean="0">
+                          <a:solidFill>
+                            <a:srgbClr val="000000"/>
+                          </a:solidFill>
+                          <a:latin typeface="+mj-ea"/>
+                          <a:ea typeface="Arial"/>
+                          <a:cs typeface="Arial"/>
+                          <a:sym typeface="Arial"/>
+                        </a:rPr>
+                        <a:t>오픈예정</a:t>
+                      </a:r>
+                      <a:r>
+                        <a:rPr lang="ko-KR" altLang="en-US" sz="1200" b="0" i="0" u="none" strike="noStrike" cap="none" dirty="0" smtClean="0">
+                          <a:solidFill>
+                            <a:srgbClr val="000000"/>
+                          </a:solidFill>
+                          <a:latin typeface="+mj-ea"/>
+                          <a:ea typeface="Arial"/>
+                          <a:cs typeface="Arial"/>
+                          <a:sym typeface="Arial"/>
+                        </a:rPr>
+                        <a:t> 프로젝트</a:t>
+                      </a:r>
+                      <a:r>
+                        <a:rPr lang="en-US" altLang="ko-KR" sz="1200" b="0" i="0" u="none" strike="noStrike" cap="none" dirty="0" smtClean="0">
+                          <a:solidFill>
+                            <a:srgbClr val="000000"/>
+                          </a:solidFill>
+                          <a:latin typeface="+mj-ea"/>
+                          <a:ea typeface="Arial"/>
+                          <a:cs typeface="Arial"/>
+                          <a:sym typeface="Arial"/>
+                        </a:rPr>
+                        <a:t>, </a:t>
+                      </a:r>
+                      <a:r>
+                        <a:rPr lang="ko-KR" altLang="en-US" sz="1200" b="0" i="0" u="none" strike="noStrike" cap="none" dirty="0" smtClean="0">
+                          <a:solidFill>
+                            <a:srgbClr val="000000"/>
+                          </a:solidFill>
+                          <a:latin typeface="+mj-ea"/>
+                          <a:ea typeface="Arial"/>
+                          <a:cs typeface="Arial"/>
+                          <a:sym typeface="Arial"/>
+                        </a:rPr>
+                        <a:t>달성 완료 프로젝트</a:t>
+                      </a:r>
+                      <a:r>
+                        <a:rPr lang="en-US" altLang="ko-KR" sz="1200" b="0" i="0" u="none" strike="noStrike" cap="none" dirty="0" smtClean="0">
+                          <a:solidFill>
+                            <a:srgbClr val="000000"/>
+                          </a:solidFill>
+                          <a:latin typeface="+mj-ea"/>
+                          <a:ea typeface="Arial"/>
+                          <a:cs typeface="Arial"/>
+                          <a:sym typeface="Arial"/>
+                        </a:rPr>
+                        <a:t>, </a:t>
+                      </a:r>
+                      <a:r>
+                        <a:rPr lang="ko-KR" altLang="en-US" sz="1200" b="0" i="0" u="none" strike="noStrike" cap="none" dirty="0" smtClean="0">
+                          <a:solidFill>
+                            <a:srgbClr val="000000"/>
+                          </a:solidFill>
+                          <a:latin typeface="+mj-ea"/>
+                          <a:ea typeface="Arial"/>
+                          <a:cs typeface="Arial"/>
+                          <a:sym typeface="Arial"/>
+                        </a:rPr>
+                        <a:t>달성 실패 프로젝트</a:t>
+                      </a:r>
+                      <a:r>
+                        <a:rPr lang="en-US" altLang="ko-KR" sz="1200" b="0" i="0" u="none" strike="noStrike" cap="none" dirty="0" smtClean="0">
+                          <a:solidFill>
+                            <a:srgbClr val="000000"/>
+                          </a:solidFill>
+                          <a:latin typeface="+mj-ea"/>
+                          <a:ea typeface="Arial"/>
+                          <a:cs typeface="Arial"/>
+                          <a:sym typeface="Arial"/>
+                        </a:rPr>
+                        <a:t>, </a:t>
+                      </a:r>
+                      <a:r>
+                        <a:rPr lang="ko-KR" altLang="en-US" sz="1200" b="0" i="0" u="none" strike="noStrike" cap="none" dirty="0" smtClean="0">
+                          <a:solidFill>
+                            <a:srgbClr val="000000"/>
+                          </a:solidFill>
+                          <a:latin typeface="+mj-ea"/>
+                          <a:ea typeface="Arial"/>
+                          <a:cs typeface="Arial"/>
+                          <a:sym typeface="Arial"/>
+                        </a:rPr>
+                        <a:t>성공 및 달성 가능성 높은 프로젝트 목록</a:t>
+                      </a:r>
+                      <a:endParaRPr lang="ko-KR" altLang="en-US" sz="1200" b="0" i="0" u="none" strike="noStrike" cap="none" dirty="0" smtClean="0">
+                        <a:solidFill>
+                          <a:schemeClr val="tx1"/>
+                        </a:solidFill>
+                        <a:latin typeface="+mj-ea"/>
+                        <a:ea typeface="+mn-ea"/>
+                        <a:cs typeface="+mn-cs"/>
+                        <a:sym typeface="Arial"/>
+                      </a:endParaRPr>
+                    </a:p>
+                  </a:txBody>
+                  <a:tcPr marL="121920" marR="121920" marT="60960" marB="60960"/>
+                </a:tc>
+              </a:tr>
+              <a:tr h="544133">
+                <a:tc>
+                  <a:txBody>
+                    <a:bodyPr/>
+                    <a:lstStyle/>
+                    <a:p>
+                      <a:pPr algn="ctr" latinLnBrk="0"/>
+                      <a:r>
+                        <a:rPr lang="en-US" altLang="ko-KR" sz="1300" smtClean="0">
+                          <a:latin typeface="+mj-ea"/>
+                          <a:ea typeface="+mj-ea"/>
+                        </a:rPr>
+                        <a:t>3</a:t>
+                      </a:r>
+                      <a:endParaRPr lang="ko-KR" altLang="en-US" sz="1300" dirty="0">
+                        <a:latin typeface="+mj-ea"/>
+                        <a:ea typeface="+mj-ea"/>
+                      </a:endParaRPr>
+                    </a:p>
+                  </a:txBody>
+                  <a:tcPr marL="121920" marR="121920" marT="60960" marB="60960" anchor="ctr"/>
+                </a:tc>
+                <a:tc>
+                  <a:txBody>
+                    <a:bodyPr/>
+                    <a:lstStyle/>
+                    <a:p>
+                      <a:pPr algn="l" latinLnBrk="0">
+                        <a:lnSpc>
+                          <a:spcPts val="1300"/>
+                        </a:lnSpc>
+                      </a:pPr>
+                      <a:r>
+                        <a:rPr lang="ko-KR" altLang="en-US" sz="1200" b="1" i="0" u="none" strike="noStrike" cap="none" dirty="0" smtClean="0">
+                          <a:solidFill>
+                            <a:schemeClr val="tx1"/>
+                          </a:solidFill>
+                          <a:latin typeface="+mj-ea"/>
+                          <a:ea typeface="+mn-ea"/>
+                          <a:cs typeface="+mn-cs"/>
+                          <a:sym typeface="Arial"/>
+                        </a:rPr>
+                        <a:t>검색</a:t>
+                      </a:r>
+                      <a:endParaRPr lang="en-US" altLang="ko-KR" sz="1200" b="1" i="0" u="none" strike="noStrike" cap="none" dirty="0" smtClean="0">
+                        <a:solidFill>
+                          <a:schemeClr val="tx1"/>
+                        </a:solidFill>
+                        <a:latin typeface="+mj-ea"/>
+                        <a:ea typeface="+mn-ea"/>
+                        <a:cs typeface="+mn-cs"/>
+                        <a:sym typeface="Arial"/>
+                      </a:endParaRPr>
+                    </a:p>
+                    <a:p>
+                      <a:pPr marL="171450" indent="-171450" algn="l" latinLnBrk="1">
+                        <a:lnSpc>
+                          <a:spcPts val="1300"/>
+                        </a:lnSpc>
+                        <a:buFontTx/>
+                        <a:buChar char="-"/>
+                      </a:pPr>
+                      <a:r>
+                        <a:rPr lang="ko-KR" altLang="en-US" sz="1200" b="0" i="0" u="none" strike="noStrike" cap="none" dirty="0" smtClean="0">
+                          <a:solidFill>
+                            <a:schemeClr val="tx1"/>
+                          </a:solidFill>
+                          <a:latin typeface="+mj-ea"/>
+                          <a:ea typeface="+mn-ea"/>
+                          <a:cs typeface="+mn-cs"/>
+                          <a:sym typeface="Arial"/>
+                        </a:rPr>
+                        <a:t>프로젝트 키워드 검색</a:t>
+                      </a:r>
+                      <a:endParaRPr lang="ko-KR" altLang="en-US" sz="1200" b="0" i="0" u="none" strike="noStrike" cap="none" dirty="0">
+                        <a:solidFill>
+                          <a:schemeClr val="tx1"/>
+                        </a:solidFill>
+                        <a:latin typeface="+mj-ea"/>
+                        <a:ea typeface="+mn-ea"/>
+                        <a:cs typeface="+mn-cs"/>
+                        <a:sym typeface="Arial"/>
+                      </a:endParaRPr>
+                    </a:p>
+                  </a:txBody>
+                  <a:tcPr marL="121920" marR="121920" marT="60960" marB="60960"/>
+                </a:tc>
+              </a:tr>
+              <a:tr h="689235">
+                <a:tc>
+                  <a:txBody>
+                    <a:bodyPr/>
+                    <a:lstStyle/>
+                    <a:p>
+                      <a:pPr algn="ctr" latinLnBrk="0"/>
+                      <a:r>
+                        <a:rPr lang="en-US" altLang="ko-KR" sz="1300" dirty="0" smtClean="0">
+                          <a:latin typeface="+mj-ea"/>
+                          <a:ea typeface="+mj-ea"/>
+                        </a:rPr>
+                        <a:t>4</a:t>
+                      </a:r>
+                      <a:endParaRPr lang="ko-KR" altLang="en-US" sz="1300" dirty="0">
+                        <a:latin typeface="+mj-ea"/>
+                        <a:ea typeface="+mj-ea"/>
+                      </a:endParaRPr>
+                    </a:p>
+                  </a:txBody>
+                  <a:tcPr marL="121920" marR="121920" marT="60960" marB="60960" anchor="ctr"/>
+                </a:tc>
+                <a:tc>
+                  <a:txBody>
+                    <a:bodyPr/>
+                    <a:lstStyle/>
+                    <a:p>
+                      <a:pPr algn="l" latinLnBrk="0">
+                        <a:lnSpc>
+                          <a:spcPts val="1300"/>
+                        </a:lnSpc>
+                      </a:pPr>
+                      <a:r>
+                        <a:rPr lang="ko-KR" altLang="en-US" sz="1200" b="1" i="0" u="none" strike="noStrike" cap="none" dirty="0" smtClean="0">
+                          <a:solidFill>
+                            <a:schemeClr val="tx1"/>
+                          </a:solidFill>
+                          <a:latin typeface="+mj-ea"/>
+                          <a:ea typeface="+mn-ea"/>
+                          <a:cs typeface="+mn-cs"/>
+                          <a:sym typeface="Arial"/>
+                        </a:rPr>
+                        <a:t>정렬</a:t>
+                      </a:r>
+                      <a:endParaRPr lang="en-US" altLang="ko-KR" sz="1200" b="1" i="0" u="none" strike="noStrike" cap="none" dirty="0" smtClean="0">
+                        <a:solidFill>
+                          <a:schemeClr val="tx1"/>
+                        </a:solidFill>
+                        <a:latin typeface="+mj-ea"/>
+                        <a:ea typeface="+mn-ea"/>
+                        <a:cs typeface="+mn-cs"/>
+                        <a:sym typeface="Arial"/>
+                      </a:endParaRPr>
+                    </a:p>
+                    <a:p>
+                      <a:pPr marL="171450" indent="-171450" algn="l" latinLnBrk="0">
+                        <a:lnSpc>
+                          <a:spcPts val="1300"/>
+                        </a:lnSpc>
+                        <a:buFontTx/>
+                        <a:buChar char="-"/>
+                      </a:pPr>
+                      <a:r>
+                        <a:rPr lang="ko-KR" altLang="en-US" sz="1200" b="0" i="0" u="none" strike="noStrike" cap="none" dirty="0" err="1" smtClean="0">
+                          <a:solidFill>
+                            <a:schemeClr val="tx1"/>
+                          </a:solidFill>
+                          <a:latin typeface="+mj-ea"/>
+                          <a:ea typeface="+mn-ea"/>
+                          <a:cs typeface="+mn-cs"/>
+                          <a:sym typeface="Arial"/>
+                        </a:rPr>
+                        <a:t>최신순</a:t>
+                      </a:r>
+                      <a:r>
+                        <a:rPr lang="en-US" altLang="ko-KR" sz="1200" b="0" i="0" u="none" strike="noStrike" cap="none" dirty="0" smtClean="0">
+                          <a:solidFill>
+                            <a:schemeClr val="tx1"/>
+                          </a:solidFill>
+                          <a:latin typeface="+mj-ea"/>
+                          <a:ea typeface="+mn-ea"/>
+                          <a:cs typeface="+mn-cs"/>
+                          <a:sym typeface="Arial"/>
+                        </a:rPr>
+                        <a:t>, </a:t>
+                      </a:r>
+                      <a:r>
+                        <a:rPr lang="ko-KR" altLang="en-US" sz="1200" b="0" i="0" u="none" strike="noStrike" cap="none" dirty="0" smtClean="0">
+                          <a:solidFill>
+                            <a:schemeClr val="tx1"/>
+                          </a:solidFill>
+                          <a:latin typeface="+mj-ea"/>
+                          <a:ea typeface="+mn-ea"/>
+                          <a:cs typeface="+mn-cs"/>
+                          <a:sym typeface="Arial"/>
+                        </a:rPr>
+                        <a:t>인기순</a:t>
+                      </a:r>
+                      <a:r>
+                        <a:rPr lang="en-US" altLang="ko-KR" sz="1200" b="0" i="0" u="none" strike="noStrike" cap="none" dirty="0" smtClean="0">
+                          <a:solidFill>
+                            <a:schemeClr val="tx1"/>
+                          </a:solidFill>
+                          <a:latin typeface="+mj-ea"/>
+                          <a:ea typeface="+mn-ea"/>
+                          <a:cs typeface="+mn-cs"/>
+                          <a:sym typeface="Arial"/>
+                        </a:rPr>
+                        <a:t>, </a:t>
+                      </a:r>
+                      <a:r>
+                        <a:rPr lang="ko-KR" altLang="en-US" sz="1200" b="0" i="0" u="none" strike="noStrike" cap="none" dirty="0" err="1" smtClean="0">
+                          <a:solidFill>
+                            <a:schemeClr val="tx1"/>
+                          </a:solidFill>
+                          <a:latin typeface="+mj-ea"/>
+                          <a:ea typeface="+mn-ea"/>
+                          <a:cs typeface="+mn-cs"/>
+                          <a:sym typeface="Arial"/>
+                        </a:rPr>
+                        <a:t>펀딩금액순</a:t>
+                      </a:r>
+                      <a:r>
+                        <a:rPr lang="ko-KR" altLang="en-US" sz="1200" b="0" i="0" u="none" strike="noStrike" cap="none" dirty="0" smtClean="0">
+                          <a:solidFill>
+                            <a:schemeClr val="tx1"/>
+                          </a:solidFill>
+                          <a:latin typeface="+mj-ea"/>
+                          <a:ea typeface="+mn-ea"/>
+                          <a:cs typeface="+mn-cs"/>
+                          <a:sym typeface="Arial"/>
+                        </a:rPr>
+                        <a:t> 등으로 정렬</a:t>
+                      </a:r>
+                    </a:p>
+                  </a:txBody>
+                  <a:tcPr marL="121920" marR="121920" marT="60960" marB="60960"/>
+                </a:tc>
+              </a:tr>
+              <a:tr h="544133">
+                <a:tc>
+                  <a:txBody>
+                    <a:bodyPr/>
+                    <a:lstStyle/>
+                    <a:p>
+                      <a:pPr algn="ctr" latinLnBrk="0"/>
+                      <a:r>
+                        <a:rPr lang="en-US" altLang="ko-KR" sz="1300" dirty="0" smtClean="0">
+                          <a:latin typeface="+mj-ea"/>
+                          <a:ea typeface="+mj-ea"/>
+                        </a:rPr>
+                        <a:t>5</a:t>
+                      </a:r>
+                      <a:endParaRPr lang="ko-KR" altLang="en-US" sz="1300" dirty="0">
+                        <a:latin typeface="+mj-ea"/>
+                        <a:ea typeface="+mj-ea"/>
+                      </a:endParaRPr>
+                    </a:p>
+                  </a:txBody>
+                  <a:tcPr marL="121920" marR="121920" marT="60960" marB="60960" anchor="ctr"/>
+                </a:tc>
+                <a:tc>
+                  <a:txBody>
+                    <a:bodyPr/>
+                    <a:lstStyle/>
+                    <a:p>
+                      <a:pPr algn="l" latinLnBrk="0">
+                        <a:lnSpc>
+                          <a:spcPts val="1300"/>
+                        </a:lnSpc>
+                      </a:pPr>
+                      <a:endParaRPr lang="ko-KR" altLang="en-US" sz="1200" dirty="0">
+                        <a:latin typeface="+mj-ea"/>
+                        <a:ea typeface="+mj-ea"/>
+                      </a:endParaRPr>
+                    </a:p>
+                  </a:txBody>
+                  <a:tcPr marL="121920" marR="121920" marT="60960" marB="60960"/>
+                </a:tc>
+              </a:tr>
+            </a:tbl>
+          </a:graphicData>
+        </a:graphic>
+      </p:graphicFrame>
+    </p:spTree>
+    <p:extLst>
+      <p:ext uri="{BB962C8B-B14F-4D97-AF65-F5344CB8AC3E}">
+        <p14:creationId xmlns:p14="http://schemas.microsoft.com/office/powerpoint/2010/main" val="675018665"/>
+      </p:ext>
+    </p:extLst>
+  </p:cSld>
+  <p:clrMapOvr>
+    <a:masterClrMapping/>
+  </p:clrMapOvr>
+  <p:timing>
+    <p:tnLst>
+      <p:par>
+        <p:cTn id="1" dur="indefinite" restart="never" nodeType="tmRoot"/>
+      </p:par>
+    </p:tnLst>
+  </p:timing>
+</p:sld>
+</file>
+
+<file path=ppt/slides/slide8.xml><?xml version="1.0" encoding="utf-8"?>
+<p:sld xmlns:a="http://schemas.openxmlformats.org/drawingml/2006/main" xmlns:r="http://schemas.openxmlformats.org/officeDocument/2006/relationships" xmlns:p="http://schemas.openxmlformats.org/presentationml/2006/main">
+  <p:cSld>
+    <p:spTree>
+      <p:nvGrpSpPr>
+        <p:cNvPr id="1" name=""/>
+        <p:cNvGrpSpPr/>
+        <p:nvPr/>
+      </p:nvGrpSpPr>
+      <p:grpSpPr>
+        <a:xfrm>
+          <a:off x="0" y="0"/>
+          <a:ext cx="0" cy="0"/>
+          <a:chOff x="0" y="0"/>
+          <a:chExt cx="0" cy="0"/>
+        </a:xfrm>
+      </p:grpSpPr>
+      <p:sp>
+        <p:nvSpPr>
+          <p:cNvPr id="6" name="양쪽 모서리가 둥근 사각형 5"/>
+          <p:cNvSpPr/>
+          <p:nvPr/>
+        </p:nvSpPr>
+        <p:spPr>
+          <a:xfrm>
+            <a:off x="143339" y="548680"/>
+            <a:ext cx="11905323" cy="6144683"/>
+          </a:xfrm>
+          <a:prstGeom prst="round2SameRect">
+            <a:avLst>
+              <a:gd name="adj1" fmla="val 0"/>
+              <a:gd name="adj2" fmla="val 2405"/>
+            </a:avLst>
+          </a:prstGeom>
+          <a:solidFill>
+            <a:schemeClr val="bg1"/>
+          </a:solidFill>
+          <a:ln>
+            <a:noFill/>
+          </a:ln>
+          <a:effectLst>
+            <a:outerShdw dist="254000" dir="5400000" sx="97000" sy="97000" algn="t" rotWithShape="0">
+              <a:prstClr val="black">
+                <a:alpha val="40000"/>
+              </a:prstClr>
+            </a:outerShdw>
+          </a:effectLst>
+        </p:spPr>
+        <p:style>
+          <a:lnRef idx="2">
+            <a:schemeClr val="accent1">
+              <a:shade val="50000"/>
+            </a:schemeClr>
+          </a:lnRef>
+          <a:fillRef idx="1">
+            <a:schemeClr val="accent1"/>
+          </a:fillRef>
+          <a:effectRef idx="0">
+            <a:schemeClr val="accent1"/>
+          </a:effectRef>
+          <a:fontRef idx="minor">
+            <a:schemeClr val="lt1"/>
+          </a:fontRef>
+        </p:style>
+        <p:txBody>
+          <a:bodyPr lIns="91440" tIns="45720" rIns="91440" bIns="45720" rtlCol="0" anchor="ctr"/>
+          <a:lstStyle/>
+          <a:p>
+            <a:pPr algn="ctr" latinLnBrk="0">
+              <a:buClr>
+                <a:srgbClr val="000000"/>
+              </a:buClr>
+              <a:buFont typeface="Arial"/>
+              <a:buNone/>
+            </a:pPr>
+            <a:endParaRPr lang="ko-KR" altLang="en-US" sz="1867" kern="0">
+              <a:solidFill>
+                <a:prstClr val="white"/>
+              </a:solidFill>
+              <a:sym typeface="Arial"/>
+            </a:endParaRPr>
+          </a:p>
+        </p:txBody>
+      </p:sp>
+      <p:sp>
+        <p:nvSpPr>
+          <p:cNvPr id="5" name="양쪽 모서리가 둥근 사각형 4"/>
+          <p:cNvSpPr/>
+          <p:nvPr/>
+        </p:nvSpPr>
+        <p:spPr>
+          <a:xfrm>
+            <a:off x="143339" y="243880"/>
+            <a:ext cx="11905323" cy="304800"/>
+          </a:xfrm>
+          <a:prstGeom prst="round2SameRect">
+            <a:avLst>
+              <a:gd name="adj1" fmla="val 44667"/>
+              <a:gd name="adj2" fmla="val 0"/>
+            </a:avLst>
+          </a:prstGeom>
+          <a:solidFill>
+            <a:srgbClr val="411F42"/>
+          </a:solidFill>
+          <a:ln>
+            <a:noFill/>
+          </a:ln>
+          <a:effectLst>
+            <a:outerShdw dist="76200" dir="16200000" sx="97000" sy="97000" rotWithShape="0">
+              <a:prstClr val="black">
+                <a:alpha val="40000"/>
+              </a:prstClr>
+            </a:outerShdw>
+          </a:effectLst>
+        </p:spPr>
+        <p:style>
+          <a:lnRef idx="2">
+            <a:schemeClr val="accent1">
+              <a:shade val="50000"/>
+            </a:schemeClr>
+          </a:lnRef>
+          <a:fillRef idx="1">
+            <a:schemeClr val="accent1"/>
+          </a:fillRef>
+          <a:effectRef idx="0">
+            <a:schemeClr val="accent1"/>
+          </a:effectRef>
+          <a:fontRef idx="minor">
+            <a:schemeClr val="lt1"/>
+          </a:fontRef>
+        </p:style>
+        <p:txBody>
+          <a:bodyPr lIns="91440" tIns="45720" rIns="91440" bIns="45720" rtlCol="0" anchor="ctr"/>
+          <a:lstStyle/>
+          <a:p>
+            <a:pPr algn="ctr" latinLnBrk="0">
+              <a:buClr>
+                <a:srgbClr val="000000"/>
+              </a:buClr>
+              <a:buFont typeface="Arial"/>
+              <a:buNone/>
+            </a:pPr>
+            <a:endParaRPr lang="ko-KR" altLang="en-US" sz="1867" kern="0">
+              <a:solidFill>
+                <a:prstClr val="white"/>
+              </a:solidFill>
+              <a:sym typeface="Arial"/>
+            </a:endParaRPr>
+          </a:p>
+        </p:txBody>
+      </p:sp>
+      <p:sp>
+        <p:nvSpPr>
+          <p:cNvPr id="7" name="직사각형 6"/>
+          <p:cNvSpPr/>
+          <p:nvPr/>
+        </p:nvSpPr>
+        <p:spPr>
+          <a:xfrm>
+            <a:off x="935120" y="366664"/>
+            <a:ext cx="10613801" cy="72000"/>
+          </a:xfrm>
+          <a:prstGeom prst="rect">
+            <a:avLst/>
+          </a:prstGeom>
+          <a:solidFill>
+            <a:schemeClr val="bg1"/>
+          </a:solidFill>
+          <a:ln>
+            <a:noFill/>
+          </a:ln>
+        </p:spPr>
+        <p:style>
+          <a:lnRef idx="2">
+            <a:schemeClr val="accent1">
+              <a:shade val="50000"/>
+            </a:schemeClr>
+          </a:lnRef>
+          <a:fillRef idx="1">
+            <a:schemeClr val="accent1"/>
+          </a:fillRef>
+          <a:effectRef idx="0">
+            <a:schemeClr val="accent1"/>
+          </a:effectRef>
+          <a:fontRef idx="minor">
+            <a:schemeClr val="lt1"/>
+          </a:fontRef>
+        </p:style>
+        <p:txBody>
+          <a:bodyPr lIns="91440" tIns="45720" rIns="91440" bIns="45720" rtlCol="0" anchor="ctr"/>
+          <a:lstStyle/>
+          <a:p>
+            <a:pPr algn="ctr" latinLnBrk="0">
+              <a:buClr>
+                <a:srgbClr val="000000"/>
+              </a:buClr>
+              <a:buFont typeface="Arial"/>
+              <a:buNone/>
+            </a:pPr>
+            <a:endParaRPr lang="ko-KR" altLang="en-US" sz="1867" kern="0">
+              <a:solidFill>
+                <a:prstClr val="white"/>
+              </a:solidFill>
+              <a:sym typeface="Arial"/>
+            </a:endParaRPr>
+          </a:p>
+        </p:txBody>
+      </p:sp>
+      <p:sp>
+        <p:nvSpPr>
+          <p:cNvPr id="8" name="타원 7"/>
+          <p:cNvSpPr/>
+          <p:nvPr/>
+        </p:nvSpPr>
+        <p:spPr>
+          <a:xfrm>
+            <a:off x="576949" y="366664"/>
+            <a:ext cx="75276" cy="72000"/>
+          </a:xfrm>
+          <a:prstGeom prst="ellipse">
+            <a:avLst/>
+          </a:prstGeom>
+          <a:solidFill>
+            <a:srgbClr val="FF6189"/>
+          </a:solidFill>
+          <a:ln>
+            <a:noFill/>
+          </a:ln>
+        </p:spPr>
+        <p:style>
+          <a:lnRef idx="2">
+            <a:schemeClr val="accent1">
+              <a:shade val="50000"/>
+            </a:schemeClr>
+          </a:lnRef>
+          <a:fillRef idx="1">
+            <a:schemeClr val="accent1"/>
+          </a:fillRef>
+          <a:effectRef idx="0">
+            <a:schemeClr val="accent1"/>
+          </a:effectRef>
+          <a:fontRef idx="minor">
+            <a:schemeClr val="lt1"/>
+          </a:fontRef>
+        </p:style>
+        <p:txBody>
+          <a:bodyPr lIns="91440" tIns="45720" rIns="91440" bIns="45720" rtlCol="0" anchor="ctr"/>
+          <a:lstStyle/>
+          <a:p>
+            <a:pPr algn="ctr" latinLnBrk="0">
+              <a:buClr>
+                <a:srgbClr val="000000"/>
+              </a:buClr>
+              <a:buFont typeface="Arial"/>
+              <a:buNone/>
+            </a:pPr>
+            <a:endParaRPr lang="ko-KR" altLang="en-US" sz="1867" kern="0">
+              <a:solidFill>
+                <a:prstClr val="white"/>
+              </a:solidFill>
+              <a:sym typeface="Arial"/>
+            </a:endParaRPr>
+          </a:p>
+        </p:txBody>
+      </p:sp>
+      <p:sp>
+        <p:nvSpPr>
+          <p:cNvPr id="9" name="타원 8"/>
+          <p:cNvSpPr/>
+          <p:nvPr/>
+        </p:nvSpPr>
+        <p:spPr>
+          <a:xfrm>
+            <a:off x="766826" y="366664"/>
+            <a:ext cx="75276" cy="72000"/>
+          </a:xfrm>
+          <a:prstGeom prst="ellipse">
+            <a:avLst/>
+          </a:prstGeom>
+          <a:solidFill>
+            <a:srgbClr val="00B0F0"/>
+          </a:solidFill>
+          <a:ln>
+            <a:noFill/>
+          </a:ln>
+        </p:spPr>
+        <p:style>
+          <a:lnRef idx="2">
+            <a:schemeClr val="accent1">
+              <a:shade val="50000"/>
+            </a:schemeClr>
+          </a:lnRef>
+          <a:fillRef idx="1">
+            <a:schemeClr val="accent1"/>
+          </a:fillRef>
+          <a:effectRef idx="0">
+            <a:schemeClr val="accent1"/>
+          </a:effectRef>
+          <a:fontRef idx="minor">
+            <a:schemeClr val="lt1"/>
+          </a:fontRef>
+        </p:style>
+        <p:txBody>
+          <a:bodyPr lIns="91440" tIns="45720" rIns="91440" bIns="45720" rtlCol="0" anchor="ctr"/>
+          <a:lstStyle/>
+          <a:p>
+            <a:pPr algn="ctr" latinLnBrk="0">
+              <a:buClr>
+                <a:srgbClr val="000000"/>
+              </a:buClr>
+              <a:buFont typeface="Arial"/>
+              <a:buNone/>
+            </a:pPr>
+            <a:endParaRPr lang="ko-KR" altLang="en-US" sz="1867" kern="0">
+              <a:solidFill>
+                <a:prstClr val="white"/>
+              </a:solidFill>
+              <a:sym typeface="Arial"/>
+            </a:endParaRPr>
+          </a:p>
+        </p:txBody>
+      </p:sp>
+      <p:sp>
+        <p:nvSpPr>
+          <p:cNvPr id="10" name="타원 9"/>
+          <p:cNvSpPr/>
+          <p:nvPr/>
+        </p:nvSpPr>
+        <p:spPr>
+          <a:xfrm>
+            <a:off x="956703" y="366664"/>
+            <a:ext cx="75276" cy="72000"/>
+          </a:xfrm>
+          <a:prstGeom prst="ellipse">
+            <a:avLst/>
+          </a:prstGeom>
+          <a:solidFill>
+            <a:schemeClr val="accent4"/>
+          </a:solidFill>
+          <a:ln>
+            <a:noFill/>
+          </a:ln>
+        </p:spPr>
+        <p:style>
+          <a:lnRef idx="2">
+            <a:schemeClr val="accent1">
+              <a:shade val="50000"/>
+            </a:schemeClr>
+          </a:lnRef>
+          <a:fillRef idx="1">
+            <a:schemeClr val="accent1"/>
+          </a:fillRef>
+          <a:effectRef idx="0">
+            <a:schemeClr val="accent1"/>
+          </a:effectRef>
+          <a:fontRef idx="minor">
+            <a:schemeClr val="lt1"/>
+          </a:fontRef>
+        </p:style>
+        <p:txBody>
+          <a:bodyPr lIns="91440" tIns="45720" rIns="91440" bIns="45720" rtlCol="0" anchor="ctr"/>
+          <a:lstStyle/>
+          <a:p>
+            <a:pPr algn="ctr" latinLnBrk="0">
+              <a:buClr>
+                <a:srgbClr val="000000"/>
+              </a:buClr>
+              <a:buFont typeface="Arial"/>
+              <a:buNone/>
+            </a:pPr>
+            <a:endParaRPr lang="ko-KR" altLang="en-US" sz="1867" kern="0">
+              <a:solidFill>
+                <a:prstClr val="white"/>
+              </a:solidFill>
+              <a:sym typeface="Arial"/>
+            </a:endParaRPr>
+          </a:p>
+        </p:txBody>
+      </p:sp>
+      <p:sp>
+        <p:nvSpPr>
+          <p:cNvPr id="11" name="직사각형 10"/>
+          <p:cNvSpPr/>
+          <p:nvPr/>
+        </p:nvSpPr>
+        <p:spPr>
+          <a:xfrm>
+            <a:off x="1871531" y="626202"/>
+            <a:ext cx="7532965" cy="574966"/>
+          </a:xfrm>
+          <a:prstGeom prst="rect">
+            <a:avLst/>
+          </a:prstGeom>
+        </p:spPr>
+        <p:txBody>
+          <a:bodyPr wrap="square" lIns="91440" tIns="45720" rIns="91440" bIns="45720">
+            <a:spAutoFit/>
+          </a:bodyPr>
+          <a:lstStyle/>
+          <a:p>
+            <a:pPr latinLnBrk="0">
+              <a:lnSpc>
+                <a:spcPct val="150000"/>
+              </a:lnSpc>
+              <a:buClr>
+                <a:srgbClr val="000000"/>
+              </a:buClr>
+              <a:buFont typeface="Arial"/>
+              <a:buNone/>
+            </a:pPr>
+            <a:r>
+              <a:rPr lang="en-US" altLang="ko-KR" sz="2400" b="1" kern="0" dirty="0">
+                <a:solidFill>
+                  <a:srgbClr val="000000">
+                    <a:lumMod val="75000"/>
+                    <a:lumOff val="25000"/>
+                  </a:srgbClr>
+                </a:solidFill>
+                <a:latin typeface="맑은 고딕" panose="020B0503020000020004" pitchFamily="50" charset="-127"/>
+                <a:cs typeface="Arial"/>
+                <a:sym typeface="Arial"/>
+              </a:rPr>
+              <a:t>[ </a:t>
+            </a:r>
+            <a:r>
+              <a:rPr lang="ko-KR" altLang="en-US" sz="2400" b="1" kern="0" dirty="0">
+                <a:solidFill>
+                  <a:srgbClr val="000000">
+                    <a:lumMod val="75000"/>
+                    <a:lumOff val="25000"/>
+                  </a:srgbClr>
+                </a:solidFill>
+                <a:latin typeface="맑은 고딕" panose="020B0503020000020004" pitchFamily="50" charset="-127"/>
+                <a:cs typeface="Arial"/>
+                <a:sym typeface="Arial"/>
+              </a:rPr>
+              <a:t>화면구현 </a:t>
+            </a:r>
+            <a:r>
+              <a:rPr lang="en-US" altLang="ko-KR" sz="2400" b="1" kern="0" dirty="0">
+                <a:solidFill>
+                  <a:srgbClr val="000000">
+                    <a:lumMod val="75000"/>
+                    <a:lumOff val="25000"/>
+                  </a:srgbClr>
+                </a:solidFill>
+                <a:latin typeface="맑은 고딕" panose="020B0503020000020004" pitchFamily="50" charset="-127"/>
+                <a:cs typeface="Arial"/>
+                <a:sym typeface="Arial"/>
+              </a:rPr>
+              <a:t>] </a:t>
+            </a:r>
+            <a:r>
+              <a:rPr lang="ko-KR" altLang="en-US" sz="2400" b="1" kern="0" dirty="0">
+                <a:solidFill>
+                  <a:srgbClr val="000000">
+                    <a:lumMod val="75000"/>
+                    <a:lumOff val="25000"/>
+                  </a:srgbClr>
+                </a:solidFill>
+                <a:latin typeface="맑은 고딕" panose="020B0503020000020004" pitchFamily="50" charset="-127"/>
+                <a:cs typeface="Arial"/>
+                <a:sym typeface="Arial"/>
+              </a:rPr>
+              <a:t>프로젝트 목록 </a:t>
+            </a:r>
+            <a:r>
+              <a:rPr lang="en-US" altLang="ko-KR" sz="2400" b="1" kern="0" dirty="0">
+                <a:solidFill>
+                  <a:srgbClr val="000000">
+                    <a:lumMod val="75000"/>
+                    <a:lumOff val="25000"/>
+                  </a:srgbClr>
+                </a:solidFill>
+                <a:latin typeface="맑은 고딕" panose="020B0503020000020004" pitchFamily="50" charset="-127"/>
+                <a:cs typeface="Arial"/>
+                <a:sym typeface="Arial"/>
+              </a:rPr>
+              <a:t>– </a:t>
+            </a:r>
+            <a:r>
+              <a:rPr lang="ko-KR" altLang="en-US" sz="2400" b="1" kern="0" dirty="0" err="1">
+                <a:solidFill>
+                  <a:srgbClr val="000000">
+                    <a:lumMod val="75000"/>
+                    <a:lumOff val="25000"/>
+                  </a:srgbClr>
+                </a:solidFill>
+                <a:latin typeface="맑은 고딕" panose="020B0503020000020004" pitchFamily="50" charset="-127"/>
+                <a:cs typeface="Arial"/>
+                <a:sym typeface="Arial"/>
+              </a:rPr>
+              <a:t>펀딩</a:t>
+            </a:r>
+            <a:r>
+              <a:rPr lang="ko-KR" altLang="en-US" sz="2400" b="1" kern="0" dirty="0">
+                <a:solidFill>
+                  <a:srgbClr val="000000">
+                    <a:lumMod val="75000"/>
+                    <a:lumOff val="25000"/>
+                  </a:srgbClr>
+                </a:solidFill>
+                <a:latin typeface="맑은 고딕" panose="020B0503020000020004" pitchFamily="50" charset="-127"/>
+                <a:cs typeface="Arial"/>
+                <a:sym typeface="Arial"/>
+              </a:rPr>
+              <a:t> </a:t>
+            </a:r>
+            <a:r>
+              <a:rPr lang="en-US" altLang="ko-KR" sz="2400" b="1" kern="0" dirty="0">
+                <a:solidFill>
+                  <a:srgbClr val="000000">
+                    <a:lumMod val="75000"/>
+                    <a:lumOff val="25000"/>
+                  </a:srgbClr>
+                </a:solidFill>
+                <a:latin typeface="맑은 고딕" panose="020B0503020000020004" pitchFamily="50" charset="-127"/>
+                <a:cs typeface="Arial"/>
+                <a:sym typeface="Arial"/>
+              </a:rPr>
+              <a:t>– </a:t>
+            </a:r>
+            <a:r>
+              <a:rPr lang="ko-KR" altLang="en-US" sz="2400" b="1" kern="0" dirty="0">
+                <a:solidFill>
+                  <a:srgbClr val="000000">
+                    <a:lumMod val="75000"/>
+                    <a:lumOff val="25000"/>
+                  </a:srgbClr>
+                </a:solidFill>
+                <a:latin typeface="맑은 고딕" panose="020B0503020000020004" pitchFamily="50" charset="-127"/>
+                <a:cs typeface="Arial"/>
+                <a:sym typeface="Arial"/>
+              </a:rPr>
+              <a:t>사용자</a:t>
+            </a:r>
+            <a:endParaRPr lang="ko-KR" altLang="en-US" sz="2400" b="1" kern="0" dirty="0">
+              <a:solidFill>
+                <a:srgbClr val="000000">
+                  <a:lumMod val="75000"/>
+                  <a:lumOff val="25000"/>
+                </a:srgbClr>
+              </a:solidFill>
+              <a:latin typeface="맑은 고딕" panose="020B0503020000020004" pitchFamily="50" charset="-127"/>
+              <a:cs typeface="Arial"/>
+              <a:sym typeface="Arial"/>
+            </a:endParaRPr>
+          </a:p>
+        </p:txBody>
+      </p:sp>
+      <p:pic>
+        <p:nvPicPr>
+          <p:cNvPr id="13" name="Picture 2"/>
+          <p:cNvPicPr>
+            <a:picLocks noChangeAspect="1" noChangeArrowheads="1"/>
+          </p:cNvPicPr>
+          <p:nvPr/>
+        </p:nvPicPr>
+        <p:blipFill>
+          <a:blip r:embed="rId2" cstate="print">
+            <a:extLst>
+              <a:ext uri="{28A0092B-C50C-407E-A947-70E740481C1C}">
+                <a14:useLocalDpi xmlns:a14="http://schemas.microsoft.com/office/drawing/2010/main" val="0"/>
+              </a:ext>
+            </a:extLst>
+          </a:blip>
+          <a:srcRect/>
+          <a:stretch>
+            <a:fillRect/>
+          </a:stretch>
+        </p:blipFill>
+        <p:spPr bwMode="auto">
+          <a:xfrm>
+            <a:off x="804463" y="626202"/>
+            <a:ext cx="1128060" cy="751305"/>
+          </a:xfrm>
+          <a:prstGeom prst="rect">
+            <a:avLst/>
+          </a:prstGeom>
+          <a:noFill/>
+          <a:ln>
+            <a:noFill/>
+          </a:ln>
+          <a:extLst>
+            <a:ext uri="{909E8E84-426E-40DD-AFC4-6F175D3DCCD1}">
+              <a14:hiddenFill xmlns:a14="http://schemas.microsoft.com/office/drawing/2010/main">
+                <a:solidFill>
+                  <a:schemeClr val="accent1"/>
+                </a:solidFill>
+              </a14:hiddenFill>
+            </a:ext>
+            <a:ext uri="{91240B29-F687-4F45-9708-019B960494DF}">
+              <a14:hiddenLine xmlns:a14="http://schemas.microsoft.com/office/drawing/2010/main" w="9525">
+                <a:solidFill>
+                  <a:schemeClr val="tx1"/>
+                </a:solidFill>
+                <a:miter lim="800000"/>
+                <a:headEnd/>
+                <a:tailEnd/>
+              </a14:hiddenLine>
+            </a:ext>
+          </a:extLst>
+        </p:spPr>
+      </p:pic>
+      <p:pic>
+        <p:nvPicPr>
+          <p:cNvPr id="2" name="그림 1"/>
+          <p:cNvPicPr>
+            <a:picLocks noChangeAspect="1"/>
+          </p:cNvPicPr>
+          <p:nvPr/>
+        </p:nvPicPr>
+        <p:blipFill>
+          <a:blip r:embed="rId3">
+            <a:extLst>
+              <a:ext uri="{28A0092B-C50C-407E-A947-70E740481C1C}">
+                <a14:useLocalDpi xmlns:a14="http://schemas.microsoft.com/office/drawing/2010/main" val="0"/>
+              </a:ext>
+            </a:extLst>
+          </a:blip>
+          <a:stretch>
+            <a:fillRect/>
+          </a:stretch>
+        </p:blipFill>
+        <p:spPr>
+          <a:xfrm>
+            <a:off x="1031979" y="1599977"/>
+            <a:ext cx="2714398" cy="4758920"/>
+          </a:xfrm>
+          <a:prstGeom prst="rect">
+            <a:avLst/>
+          </a:prstGeom>
+        </p:spPr>
+      </p:pic>
+    </p:spTree>
+    <p:extLst>
+      <p:ext uri="{BB962C8B-B14F-4D97-AF65-F5344CB8AC3E}">
+        <p14:creationId xmlns:p14="http://schemas.microsoft.com/office/powerpoint/2010/main" val="3668822303"/>
+      </p:ext>
+    </p:extLst>
+  </p:cSld>
+  <p:clrMapOvr>
+    <a:masterClrMapping/>
+  </p:clrMapOvr>
+  <p:timing>
+    <p:tnLst>
+      <p:par>
+        <p:cTn id="1" dur="indefinite" restart="never" nodeType="tmRoot"/>
+      </p:par>
+    </p:tnLst>
+  </p:timing>
+</p:sld>
+</file>
+
+<file path=ppt/slides/slide9.xml><?xml version="1.0" encoding="utf-8"?>
+<p:sld xmlns:a="http://schemas.openxmlformats.org/drawingml/2006/main" xmlns:r="http://schemas.openxmlformats.org/officeDocument/2006/relationships" xmlns:p="http://schemas.openxmlformats.org/presentationml/2006/main">
+  <p:cSld>
+    <p:spTree>
+      <p:nvGrpSpPr>
+        <p:cNvPr id="1" name=""/>
+        <p:cNvGrpSpPr/>
+        <p:nvPr/>
+      </p:nvGrpSpPr>
+      <p:grpSpPr>
+        <a:xfrm>
+          <a:off x="0" y="0"/>
+          <a:ext cx="0" cy="0"/>
+          <a:chOff x="0" y="0"/>
+          <a:chExt cx="0" cy="0"/>
+        </a:xfrm>
+      </p:grpSpPr>
+      <p:sp>
+        <p:nvSpPr>
+          <p:cNvPr id="6" name="양쪽 모서리가 둥근 사각형 5"/>
+          <p:cNvSpPr/>
+          <p:nvPr/>
+        </p:nvSpPr>
+        <p:spPr>
+          <a:xfrm>
+            <a:off x="143339" y="548680"/>
+            <a:ext cx="11905323" cy="6144683"/>
+          </a:xfrm>
+          <a:prstGeom prst="round2SameRect">
+            <a:avLst>
+              <a:gd name="adj1" fmla="val 0"/>
+              <a:gd name="adj2" fmla="val 2405"/>
+            </a:avLst>
+          </a:prstGeom>
+          <a:solidFill>
+            <a:schemeClr val="bg1"/>
+          </a:solidFill>
+          <a:ln>
+            <a:noFill/>
+          </a:ln>
+          <a:effectLst>
+            <a:outerShdw dist="254000" dir="5400000" sx="97000" sy="97000" algn="t" rotWithShape="0">
+              <a:prstClr val="black">
+                <a:alpha val="40000"/>
+              </a:prstClr>
+            </a:outerShdw>
+          </a:effectLst>
+        </p:spPr>
+        <p:style>
+          <a:lnRef idx="2">
+            <a:schemeClr val="accent1">
+              <a:shade val="50000"/>
+            </a:schemeClr>
+          </a:lnRef>
+          <a:fillRef idx="1">
+            <a:schemeClr val="accent1"/>
+          </a:fillRef>
+          <a:effectRef idx="0">
+            <a:schemeClr val="accent1"/>
+          </a:effectRef>
+          <a:fontRef idx="minor">
+            <a:schemeClr val="lt1"/>
+          </a:fontRef>
+        </p:style>
+        <p:txBody>
+          <a:bodyPr lIns="91440" tIns="45720" rIns="91440" bIns="45720" rtlCol="0" anchor="ctr"/>
+          <a:lstStyle/>
+          <a:p>
+            <a:pPr algn="ctr" latinLnBrk="0">
+              <a:buClr>
+                <a:srgbClr val="000000"/>
+              </a:buClr>
+              <a:buFont typeface="Arial"/>
+              <a:buNone/>
+            </a:pPr>
+            <a:endParaRPr lang="ko-KR" altLang="en-US" sz="1867" kern="0">
+              <a:solidFill>
+                <a:prstClr val="white"/>
+              </a:solidFill>
+              <a:sym typeface="Arial"/>
+            </a:endParaRPr>
+          </a:p>
+        </p:txBody>
+      </p:sp>
+      <p:sp>
+        <p:nvSpPr>
+          <p:cNvPr id="5" name="양쪽 모서리가 둥근 사각형 4"/>
+          <p:cNvSpPr/>
+          <p:nvPr/>
+        </p:nvSpPr>
+        <p:spPr>
+          <a:xfrm>
+            <a:off x="143339" y="243880"/>
+            <a:ext cx="11905323" cy="304800"/>
+          </a:xfrm>
+          <a:prstGeom prst="round2SameRect">
+            <a:avLst>
+              <a:gd name="adj1" fmla="val 44667"/>
+              <a:gd name="adj2" fmla="val 0"/>
+            </a:avLst>
+          </a:prstGeom>
+          <a:solidFill>
+            <a:srgbClr val="411F42"/>
+          </a:solidFill>
+          <a:ln>
+            <a:noFill/>
+          </a:ln>
+          <a:effectLst>
+            <a:outerShdw dist="76200" dir="16200000" sx="97000" sy="97000" rotWithShape="0">
+              <a:prstClr val="black">
+                <a:alpha val="40000"/>
+              </a:prstClr>
+            </a:outerShdw>
+          </a:effectLst>
+        </p:spPr>
+        <p:style>
+          <a:lnRef idx="2">
+            <a:schemeClr val="accent1">
+              <a:shade val="50000"/>
+            </a:schemeClr>
+          </a:lnRef>
+          <a:fillRef idx="1">
+            <a:schemeClr val="accent1"/>
+          </a:fillRef>
+          <a:effectRef idx="0">
+            <a:schemeClr val="accent1"/>
+          </a:effectRef>
+          <a:fontRef idx="minor">
+            <a:schemeClr val="lt1"/>
+          </a:fontRef>
+        </p:style>
+        <p:txBody>
+          <a:bodyPr lIns="91440" tIns="45720" rIns="91440" bIns="45720" rtlCol="0" anchor="ctr"/>
+          <a:lstStyle/>
+          <a:p>
+            <a:pPr algn="ctr" latinLnBrk="0">
+              <a:buClr>
+                <a:srgbClr val="000000"/>
+              </a:buClr>
+              <a:buFont typeface="Arial"/>
+              <a:buNone/>
+            </a:pPr>
+            <a:endParaRPr lang="ko-KR" altLang="en-US" sz="1867" kern="0">
+              <a:solidFill>
+                <a:prstClr val="white"/>
+              </a:solidFill>
+              <a:sym typeface="Arial"/>
+            </a:endParaRPr>
+          </a:p>
+        </p:txBody>
+      </p:sp>
+      <p:sp>
+        <p:nvSpPr>
+          <p:cNvPr id="7" name="직사각형 6"/>
+          <p:cNvSpPr/>
+          <p:nvPr/>
+        </p:nvSpPr>
+        <p:spPr>
+          <a:xfrm>
+            <a:off x="935120" y="366664"/>
+            <a:ext cx="10613801" cy="72000"/>
+          </a:xfrm>
+          <a:prstGeom prst="rect">
+            <a:avLst/>
+          </a:prstGeom>
+          <a:solidFill>
+            <a:schemeClr val="bg1"/>
+          </a:solidFill>
+          <a:ln>
+            <a:noFill/>
+          </a:ln>
+        </p:spPr>
+        <p:style>
+          <a:lnRef idx="2">
+            <a:schemeClr val="accent1">
+              <a:shade val="50000"/>
+            </a:schemeClr>
+          </a:lnRef>
+          <a:fillRef idx="1">
+            <a:schemeClr val="accent1"/>
+          </a:fillRef>
+          <a:effectRef idx="0">
+            <a:schemeClr val="accent1"/>
+          </a:effectRef>
+          <a:fontRef idx="minor">
+            <a:schemeClr val="lt1"/>
+          </a:fontRef>
+        </p:style>
+        <p:txBody>
+          <a:bodyPr lIns="91440" tIns="45720" rIns="91440" bIns="45720" rtlCol="0" anchor="ctr"/>
+          <a:lstStyle/>
+          <a:p>
+            <a:pPr algn="ctr" latinLnBrk="0">
+              <a:buClr>
+                <a:srgbClr val="000000"/>
+              </a:buClr>
+              <a:buFont typeface="Arial"/>
+              <a:buNone/>
+            </a:pPr>
+            <a:endParaRPr lang="ko-KR" altLang="en-US" sz="1867" kern="0">
+              <a:solidFill>
+                <a:prstClr val="white"/>
+              </a:solidFill>
+              <a:sym typeface="Arial"/>
+            </a:endParaRPr>
+          </a:p>
+        </p:txBody>
+      </p:sp>
+      <p:sp>
+        <p:nvSpPr>
+          <p:cNvPr id="8" name="타원 7"/>
+          <p:cNvSpPr/>
+          <p:nvPr/>
+        </p:nvSpPr>
+        <p:spPr>
+          <a:xfrm>
+            <a:off x="576949" y="366664"/>
+            <a:ext cx="75276" cy="72000"/>
+          </a:xfrm>
+          <a:prstGeom prst="ellipse">
+            <a:avLst/>
+          </a:prstGeom>
+          <a:solidFill>
+            <a:srgbClr val="FF6189"/>
+          </a:solidFill>
+          <a:ln>
+            <a:noFill/>
+          </a:ln>
+        </p:spPr>
+        <p:style>
+          <a:lnRef idx="2">
+            <a:schemeClr val="accent1">
+              <a:shade val="50000"/>
+            </a:schemeClr>
+          </a:lnRef>
+          <a:fillRef idx="1">
+            <a:schemeClr val="accent1"/>
+          </a:fillRef>
+          <a:effectRef idx="0">
+            <a:schemeClr val="accent1"/>
+          </a:effectRef>
+          <a:fontRef idx="minor">
+            <a:schemeClr val="lt1"/>
+          </a:fontRef>
+        </p:style>
+        <p:txBody>
+          <a:bodyPr lIns="91440" tIns="45720" rIns="91440" bIns="45720" rtlCol="0" anchor="ctr"/>
+          <a:lstStyle/>
+          <a:p>
+            <a:pPr algn="ctr" latinLnBrk="0">
+              <a:buClr>
+                <a:srgbClr val="000000"/>
+              </a:buClr>
+              <a:buFont typeface="Arial"/>
+              <a:buNone/>
+            </a:pPr>
+            <a:endParaRPr lang="ko-KR" altLang="en-US" sz="1867" kern="0">
+              <a:solidFill>
+                <a:prstClr val="white"/>
+              </a:solidFill>
+              <a:sym typeface="Arial"/>
+            </a:endParaRPr>
+          </a:p>
+        </p:txBody>
+      </p:sp>
+      <p:sp>
+        <p:nvSpPr>
+          <p:cNvPr id="9" name="타원 8"/>
+          <p:cNvSpPr/>
+          <p:nvPr/>
+        </p:nvSpPr>
+        <p:spPr>
+          <a:xfrm>
+            <a:off x="766826" y="366664"/>
+            <a:ext cx="75276" cy="72000"/>
+          </a:xfrm>
+          <a:prstGeom prst="ellipse">
+            <a:avLst/>
+          </a:prstGeom>
+          <a:solidFill>
+            <a:srgbClr val="00B0F0"/>
+          </a:solidFill>
+          <a:ln>
+            <a:noFill/>
+          </a:ln>
+        </p:spPr>
+        <p:style>
+          <a:lnRef idx="2">
+            <a:schemeClr val="accent1">
+              <a:shade val="50000"/>
+            </a:schemeClr>
+          </a:lnRef>
+          <a:fillRef idx="1">
+            <a:schemeClr val="accent1"/>
+          </a:fillRef>
+          <a:effectRef idx="0">
+            <a:schemeClr val="accent1"/>
+          </a:effectRef>
+          <a:fontRef idx="minor">
+            <a:schemeClr val="lt1"/>
+          </a:fontRef>
+        </p:style>
+        <p:txBody>
+          <a:bodyPr lIns="91440" tIns="45720" rIns="91440" bIns="45720" rtlCol="0" anchor="ctr"/>
+          <a:lstStyle/>
+          <a:p>
+            <a:pPr algn="ctr" latinLnBrk="0">
+              <a:buClr>
+                <a:srgbClr val="000000"/>
+              </a:buClr>
+              <a:buFont typeface="Arial"/>
+              <a:buNone/>
+            </a:pPr>
+            <a:endParaRPr lang="ko-KR" altLang="en-US" sz="1867" kern="0">
+              <a:solidFill>
+                <a:prstClr val="white"/>
+              </a:solidFill>
+              <a:sym typeface="Arial"/>
+            </a:endParaRPr>
+          </a:p>
+        </p:txBody>
+      </p:sp>
+      <p:sp>
+        <p:nvSpPr>
+          <p:cNvPr id="10" name="타원 9"/>
+          <p:cNvSpPr/>
+          <p:nvPr/>
+        </p:nvSpPr>
+        <p:spPr>
+          <a:xfrm>
+            <a:off x="956703" y="366664"/>
+            <a:ext cx="75276" cy="72000"/>
+          </a:xfrm>
+          <a:prstGeom prst="ellipse">
+            <a:avLst/>
+          </a:prstGeom>
+          <a:solidFill>
+            <a:schemeClr val="accent4"/>
+          </a:solidFill>
+          <a:ln>
+            <a:noFill/>
+          </a:ln>
+        </p:spPr>
+        <p:style>
+          <a:lnRef idx="2">
+            <a:schemeClr val="accent1">
+              <a:shade val="50000"/>
+            </a:schemeClr>
+          </a:lnRef>
+          <a:fillRef idx="1">
+            <a:schemeClr val="accent1"/>
+          </a:fillRef>
+          <a:effectRef idx="0">
+            <a:schemeClr val="accent1"/>
+          </a:effectRef>
+          <a:fontRef idx="minor">
+            <a:schemeClr val="lt1"/>
+          </a:fontRef>
+        </p:style>
+        <p:txBody>
+          <a:bodyPr lIns="91440" tIns="45720" rIns="91440" bIns="45720" rtlCol="0" anchor="ctr"/>
+          <a:lstStyle/>
+          <a:p>
+            <a:pPr algn="ctr" latinLnBrk="0">
+              <a:buClr>
+                <a:srgbClr val="000000"/>
+              </a:buClr>
+              <a:buFont typeface="Arial"/>
+              <a:buNone/>
+            </a:pPr>
+            <a:endParaRPr lang="ko-KR" altLang="en-US" sz="1867" kern="0">
+              <a:solidFill>
+                <a:prstClr val="white"/>
+              </a:solidFill>
+              <a:sym typeface="Arial"/>
+            </a:endParaRPr>
+          </a:p>
+        </p:txBody>
+      </p:sp>
+      <p:sp>
+        <p:nvSpPr>
+          <p:cNvPr id="11" name="직사각형 10"/>
+          <p:cNvSpPr/>
+          <p:nvPr/>
+        </p:nvSpPr>
+        <p:spPr>
+          <a:xfrm>
+            <a:off x="1871531" y="626202"/>
+            <a:ext cx="7532965" cy="574966"/>
+          </a:xfrm>
+          <a:prstGeom prst="rect">
+            <a:avLst/>
+          </a:prstGeom>
+        </p:spPr>
+        <p:txBody>
+          <a:bodyPr wrap="square" lIns="91440" tIns="45720" rIns="91440" bIns="45720">
+            <a:spAutoFit/>
+          </a:bodyPr>
+          <a:lstStyle/>
+          <a:p>
+            <a:pPr latinLnBrk="0">
+              <a:lnSpc>
+                <a:spcPct val="150000"/>
+              </a:lnSpc>
+              <a:buClr>
+                <a:srgbClr val="000000"/>
+              </a:buClr>
+              <a:buFont typeface="Arial"/>
+              <a:buNone/>
+            </a:pPr>
+            <a:r>
+              <a:rPr lang="en-US" altLang="ko-KR" sz="2400" b="1" kern="0" dirty="0">
+                <a:solidFill>
+                  <a:srgbClr val="000000">
+                    <a:lumMod val="75000"/>
+                    <a:lumOff val="25000"/>
+                  </a:srgbClr>
+                </a:solidFill>
+                <a:latin typeface="맑은 고딕" panose="020B0503020000020004" pitchFamily="50" charset="-127"/>
+                <a:cs typeface="Arial"/>
+                <a:sym typeface="Arial"/>
+              </a:rPr>
+              <a:t>[ </a:t>
+            </a:r>
+            <a:r>
+              <a:rPr lang="ko-KR" altLang="en-US" sz="2400" b="1" kern="0" dirty="0">
+                <a:solidFill>
+                  <a:srgbClr val="000000">
+                    <a:lumMod val="75000"/>
+                    <a:lumOff val="25000"/>
+                  </a:srgbClr>
+                </a:solidFill>
+                <a:latin typeface="맑은 고딕" panose="020B0503020000020004" pitchFamily="50" charset="-127"/>
+                <a:cs typeface="Arial"/>
+                <a:sym typeface="Arial"/>
+              </a:rPr>
+              <a:t>화면구현 </a:t>
+            </a:r>
+            <a:r>
+              <a:rPr lang="en-US" altLang="ko-KR" sz="2400" b="1" kern="0" dirty="0">
+                <a:solidFill>
+                  <a:srgbClr val="000000">
+                    <a:lumMod val="75000"/>
+                    <a:lumOff val="25000"/>
+                  </a:srgbClr>
+                </a:solidFill>
+                <a:latin typeface="맑은 고딕" panose="020B0503020000020004" pitchFamily="50" charset="-127"/>
+                <a:cs typeface="Arial"/>
+                <a:sym typeface="Arial"/>
+              </a:rPr>
+              <a:t>] </a:t>
+            </a:r>
+            <a:r>
+              <a:rPr lang="ko-KR" altLang="en-US" sz="2400" b="1" kern="0" dirty="0">
+                <a:solidFill>
+                  <a:srgbClr val="000000">
+                    <a:lumMod val="75000"/>
+                    <a:lumOff val="25000"/>
+                  </a:srgbClr>
+                </a:solidFill>
+                <a:latin typeface="맑은 고딕" panose="020B0503020000020004" pitchFamily="50" charset="-127"/>
+                <a:cs typeface="Arial"/>
+                <a:sym typeface="Arial"/>
+              </a:rPr>
+              <a:t>프로젝트 목록 </a:t>
+            </a:r>
+            <a:r>
+              <a:rPr lang="en-US" altLang="ko-KR" sz="2400" b="1" kern="0" dirty="0">
+                <a:solidFill>
+                  <a:srgbClr val="000000">
+                    <a:lumMod val="75000"/>
+                    <a:lumOff val="25000"/>
+                  </a:srgbClr>
+                </a:solidFill>
+                <a:latin typeface="맑은 고딕" panose="020B0503020000020004" pitchFamily="50" charset="-127"/>
+                <a:cs typeface="Arial"/>
+                <a:sym typeface="Arial"/>
+              </a:rPr>
+              <a:t>– </a:t>
+            </a:r>
+            <a:r>
+              <a:rPr lang="ko-KR" altLang="en-US" sz="2400" b="1" kern="0" dirty="0" err="1">
+                <a:solidFill>
+                  <a:srgbClr val="000000">
+                    <a:lumMod val="75000"/>
+                    <a:lumOff val="25000"/>
+                  </a:srgbClr>
+                </a:solidFill>
+                <a:latin typeface="맑은 고딕" panose="020B0503020000020004" pitchFamily="50" charset="-127"/>
+                <a:cs typeface="Arial"/>
+                <a:sym typeface="Arial"/>
+              </a:rPr>
+              <a:t>펀딩</a:t>
+            </a:r>
+            <a:r>
+              <a:rPr lang="ko-KR" altLang="en-US" sz="2400" b="1" kern="0" dirty="0">
+                <a:solidFill>
+                  <a:srgbClr val="000000">
+                    <a:lumMod val="75000"/>
+                    <a:lumOff val="25000"/>
+                  </a:srgbClr>
+                </a:solidFill>
+                <a:latin typeface="맑은 고딕" panose="020B0503020000020004" pitchFamily="50" charset="-127"/>
+                <a:cs typeface="Arial"/>
+                <a:sym typeface="Arial"/>
+              </a:rPr>
+              <a:t> </a:t>
+            </a:r>
+            <a:r>
+              <a:rPr lang="en-US" altLang="ko-KR" sz="2400" b="1" kern="0" dirty="0">
+                <a:solidFill>
+                  <a:srgbClr val="000000">
+                    <a:lumMod val="75000"/>
+                    <a:lumOff val="25000"/>
+                  </a:srgbClr>
+                </a:solidFill>
+                <a:latin typeface="맑은 고딕" panose="020B0503020000020004" pitchFamily="50" charset="-127"/>
+                <a:cs typeface="Arial"/>
+                <a:sym typeface="Arial"/>
+              </a:rPr>
+              <a:t>– </a:t>
+            </a:r>
+            <a:r>
+              <a:rPr lang="ko-KR" altLang="en-US" sz="2400" b="1" kern="0" dirty="0">
+                <a:solidFill>
+                  <a:srgbClr val="000000">
+                    <a:lumMod val="75000"/>
+                    <a:lumOff val="25000"/>
+                  </a:srgbClr>
+                </a:solidFill>
+                <a:latin typeface="맑은 고딕" panose="020B0503020000020004" pitchFamily="50" charset="-127"/>
+                <a:cs typeface="Arial"/>
+                <a:sym typeface="Arial"/>
+              </a:rPr>
+              <a:t>사용자</a:t>
+            </a:r>
+            <a:endParaRPr lang="ko-KR" altLang="en-US" sz="2400" b="1" kern="0" dirty="0">
+              <a:solidFill>
+                <a:srgbClr val="000000">
+                  <a:lumMod val="75000"/>
+                  <a:lumOff val="25000"/>
+                </a:srgbClr>
+              </a:solidFill>
+              <a:latin typeface="맑은 고딕" panose="020B0503020000020004" pitchFamily="50" charset="-127"/>
+              <a:cs typeface="Arial"/>
+              <a:sym typeface="Arial"/>
+            </a:endParaRPr>
+          </a:p>
+        </p:txBody>
+      </p:sp>
+      <p:pic>
+        <p:nvPicPr>
+          <p:cNvPr id="13" name="Picture 2"/>
+          <p:cNvPicPr>
+            <a:picLocks noChangeAspect="1" noChangeArrowheads="1"/>
+          </p:cNvPicPr>
+          <p:nvPr/>
+        </p:nvPicPr>
+        <p:blipFill>
+          <a:blip r:embed="rId2" cstate="print">
+            <a:extLst>
+              <a:ext uri="{28A0092B-C50C-407E-A947-70E740481C1C}">
+                <a14:useLocalDpi xmlns:a14="http://schemas.microsoft.com/office/drawing/2010/main" val="0"/>
+              </a:ext>
+            </a:extLst>
+          </a:blip>
+          <a:srcRect/>
+          <a:stretch>
+            <a:fillRect/>
+          </a:stretch>
+        </p:blipFill>
+        <p:spPr bwMode="auto">
+          <a:xfrm>
+            <a:off x="804463" y="626202"/>
+            <a:ext cx="1128060" cy="751305"/>
+          </a:xfrm>
+          <a:prstGeom prst="rect">
+            <a:avLst/>
+          </a:prstGeom>
+          <a:noFill/>
+          <a:ln>
+            <a:noFill/>
+          </a:ln>
+          <a:extLst>
+            <a:ext uri="{909E8E84-426E-40DD-AFC4-6F175D3DCCD1}">
+              <a14:hiddenFill xmlns:a14="http://schemas.microsoft.com/office/drawing/2010/main">
+                <a:solidFill>
+                  <a:schemeClr val="accent1"/>
+                </a:solidFill>
+              </a14:hiddenFill>
+            </a:ext>
+            <a:ext uri="{91240B29-F687-4F45-9708-019B960494DF}">
+              <a14:hiddenLine xmlns:a14="http://schemas.microsoft.com/office/drawing/2010/main" w="9525">
+                <a:solidFill>
+                  <a:schemeClr val="tx1"/>
+                </a:solidFill>
+                <a:miter lim="800000"/>
+                <a:headEnd/>
+                <a:tailEnd/>
+              </a14:hiddenLine>
+            </a:ext>
+          </a:extLst>
+        </p:spPr>
+      </p:pic>
+      <p:pic>
+        <p:nvPicPr>
+          <p:cNvPr id="2" name="그림 1"/>
+          <p:cNvPicPr>
+            <a:picLocks noChangeAspect="1"/>
+          </p:cNvPicPr>
+          <p:nvPr/>
+        </p:nvPicPr>
+        <p:blipFill>
+          <a:blip r:embed="rId3">
+            <a:extLst>
+              <a:ext uri="{28A0092B-C50C-407E-A947-70E740481C1C}">
+                <a14:useLocalDpi xmlns:a14="http://schemas.microsoft.com/office/drawing/2010/main" val="0"/>
+              </a:ext>
+            </a:extLst>
+          </a:blip>
+          <a:stretch>
+            <a:fillRect/>
+          </a:stretch>
+        </p:blipFill>
+        <p:spPr>
+          <a:xfrm>
+            <a:off x="1031979" y="1599977"/>
+            <a:ext cx="2714398" cy="4758920"/>
+          </a:xfrm>
+          <a:prstGeom prst="rect">
+            <a:avLst/>
+          </a:prstGeom>
+        </p:spPr>
+      </p:pic>
+      <p:pic>
+        <p:nvPicPr>
+          <p:cNvPr id="3" name="그림 2"/>
+          <p:cNvPicPr>
+            <a:picLocks noChangeAspect="1"/>
+          </p:cNvPicPr>
+          <p:nvPr/>
+        </p:nvPicPr>
+        <p:blipFill>
+          <a:blip r:embed="rId4"/>
+          <a:stretch>
+            <a:fillRect/>
+          </a:stretch>
+        </p:blipFill>
+        <p:spPr>
+          <a:xfrm>
+            <a:off x="4157617" y="1599977"/>
+            <a:ext cx="3486150" cy="1257300"/>
+          </a:xfrm>
+          <a:prstGeom prst="rect">
+            <a:avLst/>
+          </a:prstGeom>
+        </p:spPr>
+      </p:pic>
+      <p:sp>
+        <p:nvSpPr>
+          <p:cNvPr id="12" name="직사각형 11"/>
+          <p:cNvSpPr/>
+          <p:nvPr/>
+        </p:nvSpPr>
+        <p:spPr>
+          <a:xfrm>
+            <a:off x="4157617" y="3039324"/>
+            <a:ext cx="6096000" cy="1800493"/>
+          </a:xfrm>
+          <a:prstGeom prst="rect">
+            <a:avLst/>
+          </a:prstGeom>
+          <a:ln>
+            <a:solidFill>
+              <a:schemeClr val="tx1"/>
+            </a:solidFill>
+          </a:ln>
+        </p:spPr>
+        <p:txBody>
+          <a:bodyPr>
+            <a:spAutoFit/>
+          </a:bodyPr>
+          <a:lstStyle/>
+          <a:p>
+            <a:pPr>
+              <a:lnSpc>
+                <a:spcPct val="150000"/>
+              </a:lnSpc>
+            </a:pPr>
+            <a:r>
+              <a:rPr lang="ko-KR" altLang="en-US" dirty="0" smtClean="0">
+                <a:solidFill>
+                  <a:sysClr val="windowText" lastClr="000000"/>
+                </a:solidFill>
+                <a:latin typeface="Consolas" panose="020B0609020204030204" pitchFamily="49" charset="0"/>
+              </a:rPr>
+              <a:t>데이터베이스의 정보를 </a:t>
+            </a:r>
+            <a:r>
+              <a:rPr lang="en-US" altLang="ko-KR" dirty="0" smtClean="0">
+                <a:solidFill>
+                  <a:sysClr val="windowText" lastClr="000000"/>
+                </a:solidFill>
+                <a:latin typeface="Consolas" panose="020B0609020204030204" pitchFamily="49" charset="0"/>
+              </a:rPr>
+              <a:t>JSON </a:t>
+            </a:r>
+            <a:r>
+              <a:rPr lang="ko-KR" altLang="en-US" dirty="0" smtClean="0">
+                <a:solidFill>
+                  <a:sysClr val="windowText" lastClr="000000"/>
+                </a:solidFill>
+                <a:latin typeface="Consolas" panose="020B0609020204030204" pitchFamily="49" charset="0"/>
+              </a:rPr>
+              <a:t>형식으로 변경</a:t>
+            </a:r>
+            <a:endParaRPr lang="en-US" altLang="ko-KR" dirty="0" smtClean="0">
+              <a:solidFill>
+                <a:sysClr val="windowText" lastClr="000000"/>
+              </a:solidFill>
+              <a:latin typeface="Consolas" panose="020B0609020204030204" pitchFamily="49" charset="0"/>
+            </a:endParaRPr>
+          </a:p>
+          <a:p>
+            <a:r>
+              <a:rPr lang="en-US" altLang="ko-KR" sz="1400" dirty="0" smtClean="0">
+                <a:solidFill>
+                  <a:srgbClr val="3F7F5F"/>
+                </a:solidFill>
+                <a:latin typeface="Consolas" panose="020B0609020204030204" pitchFamily="49" charset="0"/>
+              </a:rPr>
+              <a:t>// </a:t>
+            </a:r>
+            <a:r>
+              <a:rPr lang="en-US" altLang="ko-KR" sz="1400" dirty="0">
+                <a:solidFill>
+                  <a:srgbClr val="3F7F5F"/>
+                </a:solidFill>
+                <a:latin typeface="Consolas" panose="020B0609020204030204" pitchFamily="49" charset="0"/>
+              </a:rPr>
+              <a:t>http://localhost:5080/funfun/funding.do?method=ajaxList</a:t>
+            </a:r>
+          </a:p>
+          <a:p>
+            <a:r>
+              <a:rPr lang="en-US" altLang="ko-KR" sz="1400" dirty="0">
+                <a:solidFill>
+                  <a:srgbClr val="646464"/>
+                </a:solidFill>
+                <a:latin typeface="Consolas" panose="020B0609020204030204" pitchFamily="49" charset="0"/>
+              </a:rPr>
+              <a:t>@</a:t>
+            </a:r>
+            <a:r>
+              <a:rPr lang="en-US" altLang="ko-KR" sz="1400" dirty="0" err="1">
+                <a:solidFill>
+                  <a:srgbClr val="646464"/>
+                </a:solidFill>
+                <a:latin typeface="Consolas" panose="020B0609020204030204" pitchFamily="49" charset="0"/>
+              </a:rPr>
+              <a:t>RequestMapping</a:t>
+            </a:r>
+            <a:r>
+              <a:rPr lang="en-US" altLang="ko-KR" sz="1400" dirty="0">
+                <a:solidFill>
+                  <a:srgbClr val="000000"/>
+                </a:solidFill>
+                <a:latin typeface="Consolas" panose="020B0609020204030204" pitchFamily="49" charset="0"/>
+              </a:rPr>
+              <a:t>(</a:t>
+            </a:r>
+            <a:r>
+              <a:rPr lang="en-US" altLang="ko-KR" sz="1400" dirty="0" err="1">
+                <a:solidFill>
+                  <a:srgbClr val="000000"/>
+                </a:solidFill>
+                <a:latin typeface="Consolas" panose="020B0609020204030204" pitchFamily="49" charset="0"/>
+              </a:rPr>
+              <a:t>params</a:t>
+            </a:r>
+            <a:r>
+              <a:rPr lang="en-US" altLang="ko-KR" sz="1400" dirty="0">
+                <a:solidFill>
+                  <a:srgbClr val="000000"/>
+                </a:solidFill>
+                <a:latin typeface="Consolas" panose="020B0609020204030204" pitchFamily="49" charset="0"/>
+              </a:rPr>
+              <a:t>=</a:t>
+            </a:r>
+            <a:r>
+              <a:rPr lang="en-US" altLang="ko-KR" sz="1400" dirty="0">
+                <a:solidFill>
+                  <a:srgbClr val="2A00FF"/>
+                </a:solidFill>
+                <a:latin typeface="Consolas" panose="020B0609020204030204" pitchFamily="49" charset="0"/>
+              </a:rPr>
+              <a:t>"method=</a:t>
+            </a:r>
+            <a:r>
+              <a:rPr lang="en-US" altLang="ko-KR" sz="1400" dirty="0" err="1">
+                <a:solidFill>
+                  <a:srgbClr val="2A00FF"/>
+                </a:solidFill>
+                <a:latin typeface="Consolas" panose="020B0609020204030204" pitchFamily="49" charset="0"/>
+              </a:rPr>
+              <a:t>ajaxList</a:t>
+            </a:r>
+            <a:r>
+              <a:rPr lang="en-US" altLang="ko-KR" sz="1400" dirty="0">
+                <a:solidFill>
+                  <a:srgbClr val="2A00FF"/>
+                </a:solidFill>
+                <a:latin typeface="Consolas" panose="020B0609020204030204" pitchFamily="49" charset="0"/>
+              </a:rPr>
+              <a:t>"</a:t>
+            </a:r>
+            <a:r>
+              <a:rPr lang="en-US" altLang="ko-KR" sz="1400" dirty="0">
+                <a:solidFill>
+                  <a:srgbClr val="000000"/>
+                </a:solidFill>
+                <a:latin typeface="Consolas" panose="020B0609020204030204" pitchFamily="49" charset="0"/>
+              </a:rPr>
+              <a:t>)</a:t>
+            </a:r>
+          </a:p>
+          <a:p>
+            <a:r>
+              <a:rPr lang="en-US" altLang="ko-KR" sz="1400" b="1" dirty="0">
+                <a:solidFill>
+                  <a:srgbClr val="7F0055"/>
+                </a:solidFill>
+                <a:latin typeface="Consolas" panose="020B0609020204030204" pitchFamily="49" charset="0"/>
+              </a:rPr>
+              <a:t>public</a:t>
+            </a:r>
+            <a:r>
+              <a:rPr lang="en-US" altLang="ko-KR" sz="1400" b="1" dirty="0">
+                <a:solidFill>
+                  <a:srgbClr val="000000"/>
+                </a:solidFill>
+                <a:latin typeface="Consolas" panose="020B0609020204030204" pitchFamily="49" charset="0"/>
+              </a:rPr>
+              <a:t> String </a:t>
+            </a:r>
+            <a:r>
+              <a:rPr lang="en-US" altLang="ko-KR" sz="1400" b="1" dirty="0" err="1">
+                <a:solidFill>
+                  <a:srgbClr val="000000"/>
+                </a:solidFill>
+                <a:latin typeface="Consolas" panose="020B0609020204030204" pitchFamily="49" charset="0"/>
+              </a:rPr>
+              <a:t>ajaxList</a:t>
+            </a:r>
+            <a:r>
+              <a:rPr lang="en-US" altLang="ko-KR" sz="1400" b="1" dirty="0">
+                <a:solidFill>
+                  <a:srgbClr val="000000"/>
+                </a:solidFill>
+                <a:latin typeface="Consolas" panose="020B0609020204030204" pitchFamily="49" charset="0"/>
+              </a:rPr>
+              <a:t>(Paging </a:t>
+            </a:r>
+            <a:r>
+              <a:rPr lang="en-US" altLang="ko-KR" sz="1400" b="1" dirty="0" err="1">
+                <a:solidFill>
+                  <a:srgbClr val="6A3E3E"/>
+                </a:solidFill>
+                <a:latin typeface="Consolas" panose="020B0609020204030204" pitchFamily="49" charset="0"/>
+              </a:rPr>
+              <a:t>sch</a:t>
+            </a:r>
+            <a:r>
+              <a:rPr lang="en-US" altLang="ko-KR" sz="1400" b="1" dirty="0">
+                <a:solidFill>
+                  <a:srgbClr val="000000"/>
+                </a:solidFill>
+                <a:latin typeface="Consolas" panose="020B0609020204030204" pitchFamily="49" charset="0"/>
+              </a:rPr>
+              <a:t>, Model </a:t>
+            </a:r>
+            <a:r>
+              <a:rPr lang="en-US" altLang="ko-KR" sz="1400" b="1" dirty="0">
+                <a:solidFill>
+                  <a:srgbClr val="6A3E3E"/>
+                </a:solidFill>
+                <a:latin typeface="Consolas" panose="020B0609020204030204" pitchFamily="49" charset="0"/>
+              </a:rPr>
+              <a:t>d</a:t>
+            </a:r>
+            <a:r>
+              <a:rPr lang="en-US" altLang="ko-KR" sz="1400" b="1" dirty="0" smtClean="0">
+                <a:solidFill>
+                  <a:srgbClr val="000000"/>
+                </a:solidFill>
+                <a:latin typeface="Consolas" panose="020B0609020204030204" pitchFamily="49" charset="0"/>
+              </a:rPr>
+              <a:t>) {</a:t>
+            </a:r>
+          </a:p>
+          <a:p>
+            <a:r>
+              <a:rPr lang="en-US" altLang="ko-KR" sz="1400" b="1" dirty="0">
+                <a:solidFill>
+                  <a:srgbClr val="000000"/>
+                </a:solidFill>
+                <a:latin typeface="Consolas" panose="020B0609020204030204" pitchFamily="49" charset="0"/>
+              </a:rPr>
+              <a:t> </a:t>
+            </a:r>
+            <a:r>
+              <a:rPr lang="en-US" altLang="ko-KR" sz="1400" b="1" dirty="0" smtClean="0">
+                <a:solidFill>
+                  <a:srgbClr val="000000"/>
+                </a:solidFill>
+                <a:latin typeface="Consolas" panose="020B0609020204030204" pitchFamily="49" charset="0"/>
+              </a:rPr>
+              <a:t>  </a:t>
+            </a:r>
+            <a:r>
+              <a:rPr lang="en-US" altLang="ko-KR" sz="1400" dirty="0" err="1" smtClean="0">
+                <a:solidFill>
+                  <a:srgbClr val="6A3E3E"/>
+                </a:solidFill>
+                <a:latin typeface="Consolas" panose="020B0609020204030204" pitchFamily="49" charset="0"/>
+              </a:rPr>
+              <a:t>d</a:t>
+            </a:r>
+            <a:r>
+              <a:rPr lang="en-US" altLang="ko-KR" sz="1400" dirty="0" err="1" smtClean="0">
+                <a:solidFill>
+                  <a:srgbClr val="000000"/>
+                </a:solidFill>
+                <a:latin typeface="Consolas" panose="020B0609020204030204" pitchFamily="49" charset="0"/>
+              </a:rPr>
+              <a:t>.addAttribute</a:t>
+            </a:r>
+            <a:r>
+              <a:rPr lang="en-US" altLang="ko-KR" sz="1400" dirty="0">
+                <a:solidFill>
+                  <a:srgbClr val="000000"/>
+                </a:solidFill>
+                <a:latin typeface="Consolas" panose="020B0609020204030204" pitchFamily="49" charset="0"/>
+              </a:rPr>
+              <a:t>(</a:t>
+            </a:r>
+            <a:r>
+              <a:rPr lang="en-US" altLang="ko-KR" sz="1400" dirty="0">
+                <a:solidFill>
+                  <a:srgbClr val="2A00FF"/>
+                </a:solidFill>
+                <a:latin typeface="Consolas" panose="020B0609020204030204" pitchFamily="49" charset="0"/>
+              </a:rPr>
+              <a:t>"</a:t>
+            </a:r>
+            <a:r>
+              <a:rPr lang="en-US" altLang="ko-KR" sz="1400" dirty="0" err="1">
+                <a:solidFill>
+                  <a:srgbClr val="2A00FF"/>
+                </a:solidFill>
+                <a:latin typeface="Consolas" panose="020B0609020204030204" pitchFamily="49" charset="0"/>
+              </a:rPr>
+              <a:t>plist</a:t>
+            </a:r>
+            <a:r>
+              <a:rPr lang="en-US" altLang="ko-KR" sz="1400" dirty="0">
+                <a:solidFill>
+                  <a:srgbClr val="2A00FF"/>
+                </a:solidFill>
+                <a:latin typeface="Consolas" panose="020B0609020204030204" pitchFamily="49" charset="0"/>
+              </a:rPr>
+              <a:t>"</a:t>
+            </a:r>
+            <a:r>
+              <a:rPr lang="en-US" altLang="ko-KR" sz="1400" dirty="0">
+                <a:solidFill>
+                  <a:srgbClr val="000000"/>
+                </a:solidFill>
+                <a:latin typeface="Consolas" panose="020B0609020204030204" pitchFamily="49" charset="0"/>
+              </a:rPr>
+              <a:t>, </a:t>
+            </a:r>
+            <a:r>
+              <a:rPr lang="en-US" altLang="ko-KR" sz="1400" dirty="0" err="1">
+                <a:solidFill>
+                  <a:srgbClr val="0000C0"/>
+                </a:solidFill>
+                <a:latin typeface="Consolas" panose="020B0609020204030204" pitchFamily="49" charset="0"/>
+              </a:rPr>
+              <a:t>service</a:t>
+            </a:r>
+            <a:r>
+              <a:rPr lang="en-US" altLang="ko-KR" sz="1400" dirty="0" err="1">
+                <a:solidFill>
+                  <a:srgbClr val="000000"/>
+                </a:solidFill>
+                <a:latin typeface="Consolas" panose="020B0609020204030204" pitchFamily="49" charset="0"/>
+              </a:rPr>
+              <a:t>.projectList</a:t>
+            </a:r>
+            <a:r>
+              <a:rPr lang="en-US" altLang="ko-KR" sz="1400" dirty="0">
+                <a:solidFill>
+                  <a:srgbClr val="000000"/>
+                </a:solidFill>
+                <a:latin typeface="Consolas" panose="020B0609020204030204" pitchFamily="49" charset="0"/>
+              </a:rPr>
+              <a:t>(</a:t>
+            </a:r>
+            <a:r>
+              <a:rPr lang="en-US" altLang="ko-KR" sz="1400" dirty="0" err="1">
+                <a:solidFill>
+                  <a:srgbClr val="6A3E3E"/>
+                </a:solidFill>
+                <a:latin typeface="Consolas" panose="020B0609020204030204" pitchFamily="49" charset="0"/>
+              </a:rPr>
+              <a:t>sch</a:t>
+            </a:r>
+            <a:r>
+              <a:rPr lang="en-US" altLang="ko-KR" sz="1400" dirty="0" smtClean="0">
+                <a:solidFill>
+                  <a:srgbClr val="000000"/>
+                </a:solidFill>
+                <a:latin typeface="Consolas" panose="020B0609020204030204" pitchFamily="49" charset="0"/>
+              </a:rPr>
+              <a:t>)); </a:t>
+            </a:r>
+          </a:p>
+          <a:p>
+            <a:r>
+              <a:rPr lang="en-US" altLang="ko-KR" sz="1400" b="1" dirty="0" smtClean="0">
+                <a:solidFill>
+                  <a:srgbClr val="7F0055"/>
+                </a:solidFill>
+                <a:latin typeface="Consolas" panose="020B0609020204030204" pitchFamily="49" charset="0"/>
+              </a:rPr>
+              <a:t>   return</a:t>
+            </a:r>
+            <a:r>
+              <a:rPr lang="en-US" altLang="ko-KR" sz="1400" b="1" dirty="0" smtClean="0">
+                <a:solidFill>
+                  <a:srgbClr val="000000"/>
+                </a:solidFill>
+                <a:latin typeface="Consolas" panose="020B0609020204030204" pitchFamily="49" charset="0"/>
+              </a:rPr>
+              <a:t> </a:t>
+            </a:r>
+            <a:r>
+              <a:rPr lang="en-US" altLang="ko-KR" sz="1400" b="1" dirty="0">
+                <a:solidFill>
+                  <a:srgbClr val="2A00FF"/>
+                </a:solidFill>
+                <a:latin typeface="Consolas" panose="020B0609020204030204" pitchFamily="49" charset="0"/>
+              </a:rPr>
+              <a:t>"</a:t>
+            </a:r>
+            <a:r>
+              <a:rPr lang="en-US" altLang="ko-KR" sz="1400" b="1" dirty="0" err="1">
+                <a:solidFill>
+                  <a:srgbClr val="2A00FF"/>
+                </a:solidFill>
+                <a:latin typeface="Consolas" panose="020B0609020204030204" pitchFamily="49" charset="0"/>
+              </a:rPr>
+              <a:t>pageJsonReport</a:t>
+            </a:r>
+            <a:r>
+              <a:rPr lang="en-US" altLang="ko-KR" sz="1400" b="1" dirty="0">
+                <a:solidFill>
+                  <a:srgbClr val="2A00FF"/>
+                </a:solidFill>
+                <a:latin typeface="Consolas" panose="020B0609020204030204" pitchFamily="49" charset="0"/>
+              </a:rPr>
+              <a:t>"</a:t>
+            </a:r>
+            <a:r>
+              <a:rPr lang="en-US" altLang="ko-KR" sz="1400" b="1" dirty="0">
+                <a:solidFill>
+                  <a:srgbClr val="000000"/>
+                </a:solidFill>
+                <a:latin typeface="Consolas" panose="020B0609020204030204" pitchFamily="49" charset="0"/>
+              </a:rPr>
+              <a:t>;</a:t>
+            </a:r>
+          </a:p>
+          <a:p>
+            <a:r>
+              <a:rPr lang="en-US" altLang="ko-KR" sz="1400" dirty="0">
+                <a:solidFill>
+                  <a:srgbClr val="000000"/>
+                </a:solidFill>
+                <a:latin typeface="Consolas" panose="020B0609020204030204" pitchFamily="49" charset="0"/>
+              </a:rPr>
+              <a:t>}</a:t>
+            </a:r>
+            <a:endParaRPr lang="ko-KR" altLang="en-US" sz="1400" dirty="0"/>
+          </a:p>
+        </p:txBody>
+      </p:sp>
+    </p:spTree>
+    <p:extLst>
+      <p:ext uri="{BB962C8B-B14F-4D97-AF65-F5344CB8AC3E}">
+        <p14:creationId xmlns:p14="http://schemas.microsoft.com/office/powerpoint/2010/main" val="361205903"/>
       </p:ext>
     </p:extLst>
   </p:cSld>

</xml_diff>